<commit_message>
rename SOAR Compiler to SOAR Resolver
Decision has been made to reserve the "compilation" term for source to
binary compilation, not for intern binary bytecode transformations.
</commit_message>
<xml_diff>
--- a/KernelDeveloperGuide/pptx/application_link.pptx
+++ b/KernelDeveloperGuide/pptx/application_link.pptx
@@ -239,7 +239,7 @@
               <a:rPr lang="fr-FR" smtClean="0">
                 <a:latin typeface="Calibri Regular" charset="0"/>
               </a:rPr>
-              <a:t>23/09/2021</a:t>
+              <a:t>04/05/2022</a:t>
             </a:fld>
             <a:endParaRPr lang="en-US" dirty="0">
               <a:latin typeface="Calibri Regular" charset="0"/>
@@ -427,7 +427,7 @@
           <a:p>
             <a:fld id="{D125E8DA-58CB-F841-A404-E11EC1E2C988}" type="datetime1">
               <a:rPr lang="fr-FR" smtClean="0"/>
-              <a:t>23/09/2021</a:t>
+              <a:t>04/05/2022</a:t>
             </a:fld>
             <a:endParaRPr lang="en-US" dirty="0"/>
           </a:p>
@@ -4500,7 +4500,7 @@
           <a:p>
             <a:fld id="{198ED07F-DFCB-4ABE-A311-845A3D30E5DB}" type="datetime7">
               <a:rPr lang="en-US" smtClean="0"/>
-              <a:t>Sep-21</a:t>
+              <a:t>May-22</a:t>
             </a:fld>
             <a:endParaRPr lang="en-US" dirty="0"/>
           </a:p>
@@ -28055,7 +28055,7 @@
           <p:cNvPr id="14" name="Slide Number Placeholder 5">
             <a:extLst>
               <a:ext uri="{FF2B5EF4-FFF2-40B4-BE49-F238E27FC236}">
-                <a16:creationId xmlns="" xmlns:a16="http://schemas.microsoft.com/office/drawing/2014/main" id="{D6A5EA0A-9DA9-564F-8F7D-CF263DB84C39}"/>
+                <a16:creationId xmlns:a16="http://schemas.microsoft.com/office/drawing/2014/main" xmlns="" id="{D6A5EA0A-9DA9-564F-8F7D-CF263DB84C39}"/>
               </a:ext>
             </a:extLst>
           </p:cNvPr>
@@ -28223,7 +28223,7 @@
           <p:cNvPr id="21" name="Straight Connector 20">
             <a:extLst>
               <a:ext uri="{FF2B5EF4-FFF2-40B4-BE49-F238E27FC236}">
-                <a16:creationId xmlns="" xmlns:a16="http://schemas.microsoft.com/office/drawing/2014/main" id="{F4443C96-B82D-F449-A71B-02134B6BB207}"/>
+                <a16:creationId xmlns:a16="http://schemas.microsoft.com/office/drawing/2014/main" xmlns="" id="{F4443C96-B82D-F449-A71B-02134B6BB207}"/>
               </a:ext>
             </a:extLst>
           </p:cNvPr>
@@ -28889,7 +28889,7 @@
           <p:cNvPr id="14" name="Slide Number Placeholder 5">
             <a:extLst>
               <a:ext uri="{FF2B5EF4-FFF2-40B4-BE49-F238E27FC236}">
-                <a16:creationId xmlns="" xmlns:a16="http://schemas.microsoft.com/office/drawing/2014/main" id="{D6A5EA0A-9DA9-564F-8F7D-CF263DB84C39}"/>
+                <a16:creationId xmlns:a16="http://schemas.microsoft.com/office/drawing/2014/main" xmlns="" id="{D6A5EA0A-9DA9-564F-8F7D-CF263DB84C39}"/>
               </a:ext>
             </a:extLst>
           </p:cNvPr>
@@ -29057,7 +29057,7 @@
           <p:cNvPr id="21" name="Straight Connector 20">
             <a:extLst>
               <a:ext uri="{FF2B5EF4-FFF2-40B4-BE49-F238E27FC236}">
-                <a16:creationId xmlns="" xmlns:a16="http://schemas.microsoft.com/office/drawing/2014/main" id="{F4443C96-B82D-F449-A71B-02134B6BB207}"/>
+                <a16:creationId xmlns:a16="http://schemas.microsoft.com/office/drawing/2014/main" xmlns="" id="{F4443C96-B82D-F449-A71B-02134B6BB207}"/>
               </a:ext>
             </a:extLst>
           </p:cNvPr>
@@ -29143,7 +29143,7 @@
           <p:cNvPr id="6" name="Slide Number Placeholder 5">
             <a:extLst>
               <a:ext uri="{FF2B5EF4-FFF2-40B4-BE49-F238E27FC236}">
-                <a16:creationId xmlns="" xmlns:a16="http://schemas.microsoft.com/office/drawing/2014/main" id="{D6A5EA0A-9DA9-564F-8F7D-CF263DB84C39}"/>
+                <a16:creationId xmlns:a16="http://schemas.microsoft.com/office/drawing/2014/main" xmlns="" id="{D6A5EA0A-9DA9-564F-8F7D-CF263DB84C39}"/>
               </a:ext>
             </a:extLst>
           </p:cNvPr>
@@ -29311,7 +29311,7 @@
           <p:cNvPr id="8" name="Straight Connector 7">
             <a:extLst>
               <a:ext uri="{FF2B5EF4-FFF2-40B4-BE49-F238E27FC236}">
-                <a16:creationId xmlns="" xmlns:a16="http://schemas.microsoft.com/office/drawing/2014/main" id="{F4443C96-B82D-F449-A71B-02134B6BB207}"/>
+                <a16:creationId xmlns:a16="http://schemas.microsoft.com/office/drawing/2014/main" xmlns="" id="{F4443C96-B82D-F449-A71B-02134B6BB207}"/>
               </a:ext>
             </a:extLst>
           </p:cNvPr>
@@ -30145,7 +30145,7 @@
           <p:cNvPr id="14" name="Slide Number Placeholder 5">
             <a:extLst>
               <a:ext uri="{FF2B5EF4-FFF2-40B4-BE49-F238E27FC236}">
-                <a16:creationId xmlns="" xmlns:a16="http://schemas.microsoft.com/office/drawing/2014/main" id="{D6A5EA0A-9DA9-564F-8F7D-CF263DB84C39}"/>
+                <a16:creationId xmlns:a16="http://schemas.microsoft.com/office/drawing/2014/main" xmlns="" id="{D6A5EA0A-9DA9-564F-8F7D-CF263DB84C39}"/>
               </a:ext>
             </a:extLst>
           </p:cNvPr>
@@ -30313,7 +30313,7 @@
           <p:cNvPr id="21" name="Straight Connector 20">
             <a:extLst>
               <a:ext uri="{FF2B5EF4-FFF2-40B4-BE49-F238E27FC236}">
-                <a16:creationId xmlns="" xmlns:a16="http://schemas.microsoft.com/office/drawing/2014/main" id="{F4443C96-B82D-F449-A71B-02134B6BB207}"/>
+                <a16:creationId xmlns:a16="http://schemas.microsoft.com/office/drawing/2014/main" xmlns="" id="{F4443C96-B82D-F449-A71B-02134B6BB207}"/>
               </a:ext>
             </a:extLst>
           </p:cNvPr>
@@ -30399,7 +30399,7 @@
           <p:cNvPr id="6" name="Slide Number Placeholder 5">
             <a:extLst>
               <a:ext uri="{FF2B5EF4-FFF2-40B4-BE49-F238E27FC236}">
-                <a16:creationId xmlns="" xmlns:a16="http://schemas.microsoft.com/office/drawing/2014/main" id="{D6A5EA0A-9DA9-564F-8F7D-CF263DB84C39}"/>
+                <a16:creationId xmlns:a16="http://schemas.microsoft.com/office/drawing/2014/main" xmlns="" id="{D6A5EA0A-9DA9-564F-8F7D-CF263DB84C39}"/>
               </a:ext>
             </a:extLst>
           </p:cNvPr>
@@ -30567,7 +30567,7 @@
           <p:cNvPr id="8" name="Straight Connector 7">
             <a:extLst>
               <a:ext uri="{FF2B5EF4-FFF2-40B4-BE49-F238E27FC236}">
-                <a16:creationId xmlns="" xmlns:a16="http://schemas.microsoft.com/office/drawing/2014/main" id="{F4443C96-B82D-F449-A71B-02134B6BB207}"/>
+                <a16:creationId xmlns:a16="http://schemas.microsoft.com/office/drawing/2014/main" xmlns="" id="{F4443C96-B82D-F449-A71B-02134B6BB207}"/>
               </a:ext>
             </a:extLst>
           </p:cNvPr>
@@ -31401,7 +31401,7 @@
           <p:cNvPr id="14" name="Slide Number Placeholder 5">
             <a:extLst>
               <a:ext uri="{FF2B5EF4-FFF2-40B4-BE49-F238E27FC236}">
-                <a16:creationId xmlns="" xmlns:a16="http://schemas.microsoft.com/office/drawing/2014/main" id="{D6A5EA0A-9DA9-564F-8F7D-CF263DB84C39}"/>
+                <a16:creationId xmlns:a16="http://schemas.microsoft.com/office/drawing/2014/main" xmlns="" id="{D6A5EA0A-9DA9-564F-8F7D-CF263DB84C39}"/>
               </a:ext>
             </a:extLst>
           </p:cNvPr>
@@ -31569,7 +31569,7 @@
           <p:cNvPr id="21" name="Straight Connector 20">
             <a:extLst>
               <a:ext uri="{FF2B5EF4-FFF2-40B4-BE49-F238E27FC236}">
-                <a16:creationId xmlns="" xmlns:a16="http://schemas.microsoft.com/office/drawing/2014/main" id="{F4443C96-B82D-F449-A71B-02134B6BB207}"/>
+                <a16:creationId xmlns:a16="http://schemas.microsoft.com/office/drawing/2014/main" xmlns="" id="{F4443C96-B82D-F449-A71B-02134B6BB207}"/>
               </a:ext>
             </a:extLst>
           </p:cNvPr>
@@ -31655,7 +31655,7 @@
           <p:cNvPr id="6" name="Slide Number Placeholder 5">
             <a:extLst>
               <a:ext uri="{FF2B5EF4-FFF2-40B4-BE49-F238E27FC236}">
-                <a16:creationId xmlns="" xmlns:a16="http://schemas.microsoft.com/office/drawing/2014/main" id="{D6A5EA0A-9DA9-564F-8F7D-CF263DB84C39}"/>
+                <a16:creationId xmlns:a16="http://schemas.microsoft.com/office/drawing/2014/main" xmlns="" id="{D6A5EA0A-9DA9-564F-8F7D-CF263DB84C39}"/>
               </a:ext>
             </a:extLst>
           </p:cNvPr>
@@ -31823,7 +31823,7 @@
           <p:cNvPr id="8" name="Straight Connector 7">
             <a:extLst>
               <a:ext uri="{FF2B5EF4-FFF2-40B4-BE49-F238E27FC236}">
-                <a16:creationId xmlns="" xmlns:a16="http://schemas.microsoft.com/office/drawing/2014/main" id="{F4443C96-B82D-F449-A71B-02134B6BB207}"/>
+                <a16:creationId xmlns:a16="http://schemas.microsoft.com/office/drawing/2014/main" xmlns="" id="{F4443C96-B82D-F449-A71B-02134B6BB207}"/>
               </a:ext>
             </a:extLst>
           </p:cNvPr>
@@ -32974,7 +32974,18 @@
                 <a:ea typeface="Source Sans Pro Light" charset="0"/>
                 <a:cs typeface="Source Sans Pro Light" charset="0"/>
               </a:rPr>
-              <a:t>SOAR Compiler</a:t>
+              <a:t>SOAR </a:t>
+            </a:r>
+            <a:r>
+              <a:rPr lang="en-US" sz="1000" dirty="0" smtClean="0">
+                <a:solidFill>
+                  <a:srgbClr val="FFFFFF"/>
+                </a:solidFill>
+                <a:latin typeface="Source Sans Pro Light" charset="0"/>
+                <a:ea typeface="Source Sans Pro Light" charset="0"/>
+                <a:cs typeface="Source Sans Pro Light" charset="0"/>
+              </a:rPr>
+              <a:t>Resolver</a:t>
             </a:r>
             <a:endParaRPr lang="en-US" sz="1000" dirty="0">
               <a:solidFill>
@@ -34716,7 +34727,7 @@
           <p:cNvPr id="88" name="Snip Same Side Corner Rectangle 93">
             <a:extLst>
               <a:ext uri="{FF2B5EF4-FFF2-40B4-BE49-F238E27FC236}">
-                <a16:creationId xmlns:a16="http://schemas.microsoft.com/office/drawing/2014/main" xmlns="" id="{4DB39AD4-880D-A643-9E5D-692F846ECDDD}"/>
+                <a16:creationId xmlns="" xmlns:a16="http://schemas.microsoft.com/office/drawing/2014/main" id="{4DB39AD4-880D-A643-9E5D-692F846ECDDD}"/>
               </a:ext>
             </a:extLst>
           </p:cNvPr>
@@ -35945,7 +35956,7 @@
           <p:cNvPr id="105" name="Elbow Connector 104">
             <a:extLst>
               <a:ext uri="{FF2B5EF4-FFF2-40B4-BE49-F238E27FC236}">
-                <a16:creationId xmlns:a16="http://schemas.microsoft.com/office/drawing/2014/main" xmlns="" id="{9BF3A00A-E678-994D-90B2-4880D224B0B2}"/>
+                <a16:creationId xmlns="" xmlns:a16="http://schemas.microsoft.com/office/drawing/2014/main" id="{9BF3A00A-E678-994D-90B2-4880D224B0B2}"/>
               </a:ext>
             </a:extLst>
           </p:cNvPr>
@@ -35990,7 +36001,7 @@
           <p:cNvPr id="106" name="Elbow Connector 105">
             <a:extLst>
               <a:ext uri="{FF2B5EF4-FFF2-40B4-BE49-F238E27FC236}">
-                <a16:creationId xmlns:a16="http://schemas.microsoft.com/office/drawing/2014/main" xmlns="" id="{4FE4FD2B-BE5D-7045-B933-5DA7D41C6168}"/>
+                <a16:creationId xmlns="" xmlns:a16="http://schemas.microsoft.com/office/drawing/2014/main" id="{4FE4FD2B-BE5D-7045-B933-5DA7D41C6168}"/>
               </a:ext>
             </a:extLst>
           </p:cNvPr>
@@ -36036,7 +36047,7 @@
           <p:cNvPr id="107" name="Group 106">
             <a:extLst>
               <a:ext uri="{FF2B5EF4-FFF2-40B4-BE49-F238E27FC236}">
-                <a16:creationId xmlns:a16="http://schemas.microsoft.com/office/drawing/2014/main" xmlns="" id="{B900F2F2-CE04-1E42-930A-C33ECD2E3E7A}"/>
+                <a16:creationId xmlns="" xmlns:a16="http://schemas.microsoft.com/office/drawing/2014/main" id="{B900F2F2-CE04-1E42-930A-C33ECD2E3E7A}"/>
               </a:ext>
             </a:extLst>
           </p:cNvPr>
@@ -36056,7 +36067,7 @@
             <p:cNvPr id="108" name="Picture 107">
               <a:extLst>
                 <a:ext uri="{FF2B5EF4-FFF2-40B4-BE49-F238E27FC236}">
-                  <a16:creationId xmlns:a16="http://schemas.microsoft.com/office/drawing/2014/main" xmlns="" id="{966E02F9-A3AE-D642-B86E-9F2427E9D322}"/>
+                  <a16:creationId xmlns="" xmlns:a16="http://schemas.microsoft.com/office/drawing/2014/main" id="{966E02F9-A3AE-D642-B86E-9F2427E9D322}"/>
                 </a:ext>
               </a:extLst>
             </p:cNvPr>
@@ -36092,7 +36103,7 @@
             <p:cNvPr id="109" name="TextBox 108">
               <a:extLst>
                 <a:ext uri="{FF2B5EF4-FFF2-40B4-BE49-F238E27FC236}">
-                  <a16:creationId xmlns:a16="http://schemas.microsoft.com/office/drawing/2014/main" xmlns="" id="{F736D69E-2C7D-174A-BDDD-45F1D77136D5}"/>
+                  <a16:creationId xmlns="" xmlns:a16="http://schemas.microsoft.com/office/drawing/2014/main" id="{F736D69E-2C7D-174A-BDDD-45F1D77136D5}"/>
                 </a:ext>
               </a:extLst>
             </p:cNvPr>
@@ -36146,7 +36157,7 @@
           <p:cNvPr id="110" name="TextBox 109">
             <a:extLst>
               <a:ext uri="{FF2B5EF4-FFF2-40B4-BE49-F238E27FC236}">
-                <a16:creationId xmlns:a16="http://schemas.microsoft.com/office/drawing/2014/main" xmlns="" id="{8C2367B8-8FF4-C14D-9906-82E6672825C3}"/>
+                <a16:creationId xmlns="" xmlns:a16="http://schemas.microsoft.com/office/drawing/2014/main" id="{8C2367B8-8FF4-C14D-9906-82E6672825C3}"/>
               </a:ext>
             </a:extLst>
           </p:cNvPr>
@@ -36191,7 +36202,7 @@
           <p:cNvPr id="111" name="Group 110">
             <a:extLst>
               <a:ext uri="{FF2B5EF4-FFF2-40B4-BE49-F238E27FC236}">
-                <a16:creationId xmlns:a16="http://schemas.microsoft.com/office/drawing/2014/main" xmlns="" id="{E6A58DE0-E76D-AE4C-8448-2581641B413D}"/>
+                <a16:creationId xmlns="" xmlns:a16="http://schemas.microsoft.com/office/drawing/2014/main" id="{E6A58DE0-E76D-AE4C-8448-2581641B413D}"/>
               </a:ext>
             </a:extLst>
           </p:cNvPr>
@@ -36211,7 +36222,7 @@
             <p:cNvPr id="112" name="Picture 111">
               <a:extLst>
                 <a:ext uri="{FF2B5EF4-FFF2-40B4-BE49-F238E27FC236}">
-                  <a16:creationId xmlns:a16="http://schemas.microsoft.com/office/drawing/2014/main" xmlns="" id="{5F241796-8FAA-DC4C-9D1D-62BFDCEEE94A}"/>
+                  <a16:creationId xmlns="" xmlns:a16="http://schemas.microsoft.com/office/drawing/2014/main" id="{5F241796-8FAA-DC4C-9D1D-62BFDCEEE94A}"/>
                 </a:ext>
               </a:extLst>
             </p:cNvPr>
@@ -36247,7 +36258,7 @@
             <p:cNvPr id="113" name="TextBox 112">
               <a:extLst>
                 <a:ext uri="{FF2B5EF4-FFF2-40B4-BE49-F238E27FC236}">
-                  <a16:creationId xmlns:a16="http://schemas.microsoft.com/office/drawing/2014/main" xmlns="" id="{D6F77734-4A20-CC47-84FE-6B403517D31D}"/>
+                  <a16:creationId xmlns="" xmlns:a16="http://schemas.microsoft.com/office/drawing/2014/main" id="{D6F77734-4A20-CC47-84FE-6B403517D31D}"/>
                 </a:ext>
               </a:extLst>
             </p:cNvPr>
@@ -36301,7 +36312,7 @@
           <p:cNvPr id="114" name="TextBox 113">
             <a:extLst>
               <a:ext uri="{FF2B5EF4-FFF2-40B4-BE49-F238E27FC236}">
-                <a16:creationId xmlns:a16="http://schemas.microsoft.com/office/drawing/2014/main" xmlns="" id="{C2DF5CDF-C171-D841-8B26-0F42C21B0110}"/>
+                <a16:creationId xmlns="" xmlns:a16="http://schemas.microsoft.com/office/drawing/2014/main" id="{C2DF5CDF-C171-D841-8B26-0F42C21B0110}"/>
               </a:ext>
             </a:extLst>
           </p:cNvPr>
@@ -36346,7 +36357,7 @@
           <p:cNvPr id="115" name="Elbow Connector 114">
             <a:extLst>
               <a:ext uri="{FF2B5EF4-FFF2-40B4-BE49-F238E27FC236}">
-                <a16:creationId xmlns:a16="http://schemas.microsoft.com/office/drawing/2014/main" xmlns="" id="{D130680C-7F81-8742-8D25-543F68518EC8}"/>
+                <a16:creationId xmlns="" xmlns:a16="http://schemas.microsoft.com/office/drawing/2014/main" id="{D130680C-7F81-8742-8D25-543F68518EC8}"/>
               </a:ext>
             </a:extLst>
           </p:cNvPr>
@@ -36392,7 +36403,7 @@
           <p:cNvPr id="116" name="Elbow Connector 115">
             <a:extLst>
               <a:ext uri="{FF2B5EF4-FFF2-40B4-BE49-F238E27FC236}">
-                <a16:creationId xmlns:a16="http://schemas.microsoft.com/office/drawing/2014/main" xmlns="" id="{3F54C29F-0070-7040-A58D-BB4C50958E8D}"/>
+                <a16:creationId xmlns="" xmlns:a16="http://schemas.microsoft.com/office/drawing/2014/main" id="{3F54C29F-0070-7040-A58D-BB4C50958E8D}"/>
               </a:ext>
             </a:extLst>
           </p:cNvPr>
@@ -36438,7 +36449,7 @@
           <p:cNvPr id="117" name="Group 116">
             <a:extLst>
               <a:ext uri="{FF2B5EF4-FFF2-40B4-BE49-F238E27FC236}">
-                <a16:creationId xmlns:a16="http://schemas.microsoft.com/office/drawing/2014/main" xmlns="" id="{D2D7E322-4217-344A-A21C-C074FADB1E2E}"/>
+                <a16:creationId xmlns="" xmlns:a16="http://schemas.microsoft.com/office/drawing/2014/main" id="{D2D7E322-4217-344A-A21C-C074FADB1E2E}"/>
               </a:ext>
             </a:extLst>
           </p:cNvPr>
@@ -36458,7 +36469,7 @@
             <p:cNvPr id="118" name="Picture 117">
               <a:extLst>
                 <a:ext uri="{FF2B5EF4-FFF2-40B4-BE49-F238E27FC236}">
-                  <a16:creationId xmlns:a16="http://schemas.microsoft.com/office/drawing/2014/main" xmlns="" id="{5588C56D-834F-4444-998B-991896D291C5}"/>
+                  <a16:creationId xmlns="" xmlns:a16="http://schemas.microsoft.com/office/drawing/2014/main" id="{5588C56D-834F-4444-998B-991896D291C5}"/>
                 </a:ext>
               </a:extLst>
             </p:cNvPr>
@@ -36494,7 +36505,7 @@
             <p:cNvPr id="119" name="TextBox 118">
               <a:extLst>
                 <a:ext uri="{FF2B5EF4-FFF2-40B4-BE49-F238E27FC236}">
-                  <a16:creationId xmlns:a16="http://schemas.microsoft.com/office/drawing/2014/main" xmlns="" id="{24BE9B21-5C4F-B44C-9FCA-B35F5D19A793}"/>
+                  <a16:creationId xmlns="" xmlns:a16="http://schemas.microsoft.com/office/drawing/2014/main" id="{24BE9B21-5C4F-B44C-9FCA-B35F5D19A793}"/>
                 </a:ext>
               </a:extLst>
             </p:cNvPr>
@@ -36548,7 +36559,7 @@
           <p:cNvPr id="120" name="Group 119">
             <a:extLst>
               <a:ext uri="{FF2B5EF4-FFF2-40B4-BE49-F238E27FC236}">
-                <a16:creationId xmlns:a16="http://schemas.microsoft.com/office/drawing/2014/main" xmlns="" id="{74973881-42A9-5947-BCA0-0D18B3DD7777}"/>
+                <a16:creationId xmlns="" xmlns:a16="http://schemas.microsoft.com/office/drawing/2014/main" id="{74973881-42A9-5947-BCA0-0D18B3DD7777}"/>
               </a:ext>
             </a:extLst>
           </p:cNvPr>
@@ -36568,7 +36579,7 @@
             <p:cNvPr id="121" name="Picture 120">
               <a:extLst>
                 <a:ext uri="{FF2B5EF4-FFF2-40B4-BE49-F238E27FC236}">
-                  <a16:creationId xmlns:a16="http://schemas.microsoft.com/office/drawing/2014/main" xmlns="" id="{677CB0C4-EA9C-4A42-922A-032A06D95E6A}"/>
+                  <a16:creationId xmlns="" xmlns:a16="http://schemas.microsoft.com/office/drawing/2014/main" id="{677CB0C4-EA9C-4A42-922A-032A06D95E6A}"/>
                 </a:ext>
               </a:extLst>
             </p:cNvPr>
@@ -36605,7 +36616,7 @@
             <p:cNvPr id="122" name="Picture 121">
               <a:extLst>
                 <a:ext uri="{FF2B5EF4-FFF2-40B4-BE49-F238E27FC236}">
-                  <a16:creationId xmlns:a16="http://schemas.microsoft.com/office/drawing/2014/main" xmlns="" id="{BA663F4B-8689-C448-A1A9-2580E2815CD8}"/>
+                  <a16:creationId xmlns="" xmlns:a16="http://schemas.microsoft.com/office/drawing/2014/main" id="{BA663F4B-8689-C448-A1A9-2580E2815CD8}"/>
                 </a:ext>
               </a:extLst>
             </p:cNvPr>
@@ -36791,7 +36802,7 @@
           <p:cNvPr id="21" name="Group 20">
             <a:extLst>
               <a:ext uri="{FF2B5EF4-FFF2-40B4-BE49-F238E27FC236}">
-                <a16:creationId xmlns:a16="http://schemas.microsoft.com/office/drawing/2014/main" xmlns="" id="{534F1D02-9FE3-6B41-AB49-2DFED91F0F59}"/>
+                <a16:creationId xmlns="" xmlns:a16="http://schemas.microsoft.com/office/drawing/2014/main" id="{534F1D02-9FE3-6B41-AB49-2DFED91F0F59}"/>
               </a:ext>
             </a:extLst>
           </p:cNvPr>
@@ -36811,7 +36822,7 @@
             <p:cNvPr id="20" name="Group 19">
               <a:extLst>
                 <a:ext uri="{FF2B5EF4-FFF2-40B4-BE49-F238E27FC236}">
-                  <a16:creationId xmlns:a16="http://schemas.microsoft.com/office/drawing/2014/main" xmlns="" id="{2628FA8E-D0EF-1347-A4E0-29C88A5370FB}"/>
+                  <a16:creationId xmlns="" xmlns:a16="http://schemas.microsoft.com/office/drawing/2014/main" id="{2628FA8E-D0EF-1347-A4E0-29C88A5370FB}"/>
                 </a:ext>
               </a:extLst>
             </p:cNvPr>
@@ -36831,7 +36842,7 @@
               <p:cNvPr id="7" name="Straight Connector 6">
                 <a:extLst>
                   <a:ext uri="{FF2B5EF4-FFF2-40B4-BE49-F238E27FC236}">
-                    <a16:creationId xmlns:a16="http://schemas.microsoft.com/office/drawing/2014/main" xmlns="" id="{7DAC0C41-B5C3-4945-B155-7B8F694E0B06}"/>
+                    <a16:creationId xmlns="" xmlns:a16="http://schemas.microsoft.com/office/drawing/2014/main" id="{7DAC0C41-B5C3-4945-B155-7B8F694E0B06}"/>
                   </a:ext>
                 </a:extLst>
               </p:cNvPr>
@@ -36872,7 +36883,7 @@
               <p:cNvPr id="40" name="Straight Connector 39">
                 <a:extLst>
                   <a:ext uri="{FF2B5EF4-FFF2-40B4-BE49-F238E27FC236}">
-                    <a16:creationId xmlns:a16="http://schemas.microsoft.com/office/drawing/2014/main" xmlns="" id="{8DDDF4B9-DC66-7D49-94F1-011B380F0186}"/>
+                    <a16:creationId xmlns="" xmlns:a16="http://schemas.microsoft.com/office/drawing/2014/main" id="{8DDDF4B9-DC66-7D49-94F1-011B380F0186}"/>
                   </a:ext>
                 </a:extLst>
               </p:cNvPr>
@@ -36913,7 +36924,7 @@
               <p:cNvPr id="41" name="Straight Connector 40">
                 <a:extLst>
                   <a:ext uri="{FF2B5EF4-FFF2-40B4-BE49-F238E27FC236}">
-                    <a16:creationId xmlns:a16="http://schemas.microsoft.com/office/drawing/2014/main" xmlns="" id="{7A3906A7-3863-894A-8109-9B7D9A8348D8}"/>
+                    <a16:creationId xmlns="" xmlns:a16="http://schemas.microsoft.com/office/drawing/2014/main" id="{7A3906A7-3863-894A-8109-9B7D9A8348D8}"/>
                   </a:ext>
                 </a:extLst>
               </p:cNvPr>
@@ -36954,7 +36965,7 @@
               <p:cNvPr id="42" name="Straight Connector 41">
                 <a:extLst>
                   <a:ext uri="{FF2B5EF4-FFF2-40B4-BE49-F238E27FC236}">
-                    <a16:creationId xmlns:a16="http://schemas.microsoft.com/office/drawing/2014/main" xmlns="" id="{CD555F5C-202B-C645-B9B8-F8B11FBED4C0}"/>
+                    <a16:creationId xmlns="" xmlns:a16="http://schemas.microsoft.com/office/drawing/2014/main" id="{CD555F5C-202B-C645-B9B8-F8B11FBED4C0}"/>
                   </a:ext>
                 </a:extLst>
               </p:cNvPr>
@@ -36995,7 +37006,7 @@
               <p:cNvPr id="43" name="Straight Connector 42">
                 <a:extLst>
                   <a:ext uri="{FF2B5EF4-FFF2-40B4-BE49-F238E27FC236}">
-                    <a16:creationId xmlns:a16="http://schemas.microsoft.com/office/drawing/2014/main" xmlns="" id="{91AA11E4-5A44-8C41-AFC4-4DFF0A74DC19}"/>
+                    <a16:creationId xmlns="" xmlns:a16="http://schemas.microsoft.com/office/drawing/2014/main" id="{91AA11E4-5A44-8C41-AFC4-4DFF0A74DC19}"/>
                   </a:ext>
                 </a:extLst>
               </p:cNvPr>
@@ -37036,7 +37047,7 @@
               <p:cNvPr id="45" name="Straight Connector 44">
                 <a:extLst>
                   <a:ext uri="{FF2B5EF4-FFF2-40B4-BE49-F238E27FC236}">
-                    <a16:creationId xmlns:a16="http://schemas.microsoft.com/office/drawing/2014/main" xmlns="" id="{C0670A07-8E96-B442-9ECE-FFAD0E6CAC15}"/>
+                    <a16:creationId xmlns="" xmlns:a16="http://schemas.microsoft.com/office/drawing/2014/main" id="{C0670A07-8E96-B442-9ECE-FFAD0E6CAC15}"/>
                   </a:ext>
                 </a:extLst>
               </p:cNvPr>
@@ -37077,7 +37088,7 @@
               <p:cNvPr id="46" name="Straight Connector 45">
                 <a:extLst>
                   <a:ext uri="{FF2B5EF4-FFF2-40B4-BE49-F238E27FC236}">
-                    <a16:creationId xmlns:a16="http://schemas.microsoft.com/office/drawing/2014/main" xmlns="" id="{729400E2-4F39-724D-9DA0-133D6DD97659}"/>
+                    <a16:creationId xmlns="" xmlns:a16="http://schemas.microsoft.com/office/drawing/2014/main" id="{729400E2-4F39-724D-9DA0-133D6DD97659}"/>
                   </a:ext>
                 </a:extLst>
               </p:cNvPr>
@@ -37118,7 +37129,7 @@
               <p:cNvPr id="49" name="Straight Connector 48">
                 <a:extLst>
                   <a:ext uri="{FF2B5EF4-FFF2-40B4-BE49-F238E27FC236}">
-                    <a16:creationId xmlns:a16="http://schemas.microsoft.com/office/drawing/2014/main" xmlns="" id="{0A9F23E7-6405-EB47-A17A-7B2B417E1CA5}"/>
+                    <a16:creationId xmlns="" xmlns:a16="http://schemas.microsoft.com/office/drawing/2014/main" id="{0A9F23E7-6405-EB47-A17A-7B2B417E1CA5}"/>
                   </a:ext>
                 </a:extLst>
               </p:cNvPr>
@@ -37160,7 +37171,7 @@
             <p:cNvPr id="19" name="Group 18">
               <a:extLst>
                 <a:ext uri="{FF2B5EF4-FFF2-40B4-BE49-F238E27FC236}">
-                  <a16:creationId xmlns:a16="http://schemas.microsoft.com/office/drawing/2014/main" xmlns="" id="{66F6C252-C610-0845-A1DB-66F50C2D122E}"/>
+                  <a16:creationId xmlns="" xmlns:a16="http://schemas.microsoft.com/office/drawing/2014/main" id="{66F6C252-C610-0845-A1DB-66F50C2D122E}"/>
                 </a:ext>
               </a:extLst>
             </p:cNvPr>
@@ -37180,7 +37191,7 @@
               <p:cNvPr id="50" name="Straight Connector 49">
                 <a:extLst>
                   <a:ext uri="{FF2B5EF4-FFF2-40B4-BE49-F238E27FC236}">
-                    <a16:creationId xmlns:a16="http://schemas.microsoft.com/office/drawing/2014/main" xmlns="" id="{F38ED80C-33BE-724B-81EF-D64D19C85B66}"/>
+                    <a16:creationId xmlns="" xmlns:a16="http://schemas.microsoft.com/office/drawing/2014/main" id="{F38ED80C-33BE-724B-81EF-D64D19C85B66}"/>
                   </a:ext>
                 </a:extLst>
               </p:cNvPr>
@@ -37221,7 +37232,7 @@
               <p:cNvPr id="53" name="Straight Connector 52">
                 <a:extLst>
                   <a:ext uri="{FF2B5EF4-FFF2-40B4-BE49-F238E27FC236}">
-                    <a16:creationId xmlns:a16="http://schemas.microsoft.com/office/drawing/2014/main" xmlns="" id="{F5059FE5-DEF8-664A-8968-2824BFEE96D7}"/>
+                    <a16:creationId xmlns="" xmlns:a16="http://schemas.microsoft.com/office/drawing/2014/main" id="{F5059FE5-DEF8-664A-8968-2824BFEE96D7}"/>
                   </a:ext>
                 </a:extLst>
               </p:cNvPr>
@@ -37262,7 +37273,7 @@
               <p:cNvPr id="54" name="Straight Connector 53">
                 <a:extLst>
                   <a:ext uri="{FF2B5EF4-FFF2-40B4-BE49-F238E27FC236}">
-                    <a16:creationId xmlns:a16="http://schemas.microsoft.com/office/drawing/2014/main" xmlns="" id="{1B9512E4-D3C1-A34E-9F1E-8C1C47D5FC34}"/>
+                    <a16:creationId xmlns="" xmlns:a16="http://schemas.microsoft.com/office/drawing/2014/main" id="{1B9512E4-D3C1-A34E-9F1E-8C1C47D5FC34}"/>
                   </a:ext>
                 </a:extLst>
               </p:cNvPr>
@@ -37303,7 +37314,7 @@
               <p:cNvPr id="55" name="Straight Connector 54">
                 <a:extLst>
                   <a:ext uri="{FF2B5EF4-FFF2-40B4-BE49-F238E27FC236}">
-                    <a16:creationId xmlns:a16="http://schemas.microsoft.com/office/drawing/2014/main" xmlns="" id="{0AEFDF89-7CF9-5845-80FF-DA18CAEB4F0C}"/>
+                    <a16:creationId xmlns="" xmlns:a16="http://schemas.microsoft.com/office/drawing/2014/main" id="{0AEFDF89-7CF9-5845-80FF-DA18CAEB4F0C}"/>
                   </a:ext>
                 </a:extLst>
               </p:cNvPr>
@@ -37344,7 +37355,7 @@
               <p:cNvPr id="56" name="Straight Connector 55">
                 <a:extLst>
                   <a:ext uri="{FF2B5EF4-FFF2-40B4-BE49-F238E27FC236}">
-                    <a16:creationId xmlns:a16="http://schemas.microsoft.com/office/drawing/2014/main" xmlns="" id="{63A25B54-1104-8F4E-8C0C-AA81D5D7B776}"/>
+                    <a16:creationId xmlns="" xmlns:a16="http://schemas.microsoft.com/office/drawing/2014/main" id="{63A25B54-1104-8F4E-8C0C-AA81D5D7B776}"/>
                   </a:ext>
                 </a:extLst>
               </p:cNvPr>
@@ -37385,7 +37396,7 @@
               <p:cNvPr id="57" name="Straight Connector 56">
                 <a:extLst>
                   <a:ext uri="{FF2B5EF4-FFF2-40B4-BE49-F238E27FC236}">
-                    <a16:creationId xmlns:a16="http://schemas.microsoft.com/office/drawing/2014/main" xmlns="" id="{19097575-777E-EE49-8BE9-27502F3542A0}"/>
+                    <a16:creationId xmlns="" xmlns:a16="http://schemas.microsoft.com/office/drawing/2014/main" id="{19097575-777E-EE49-8BE9-27502F3542A0}"/>
                   </a:ext>
                 </a:extLst>
               </p:cNvPr>
@@ -37426,7 +37437,7 @@
               <p:cNvPr id="58" name="Straight Connector 57">
                 <a:extLst>
                   <a:ext uri="{FF2B5EF4-FFF2-40B4-BE49-F238E27FC236}">
-                    <a16:creationId xmlns:a16="http://schemas.microsoft.com/office/drawing/2014/main" xmlns="" id="{2C764124-7866-F642-8AE0-EAFB710EF9FF}"/>
+                    <a16:creationId xmlns="" xmlns:a16="http://schemas.microsoft.com/office/drawing/2014/main" id="{2C764124-7866-F642-8AE0-EAFB710EF9FF}"/>
                   </a:ext>
                 </a:extLst>
               </p:cNvPr>
@@ -37467,7 +37478,7 @@
               <p:cNvPr id="59" name="Straight Connector 58">
                 <a:extLst>
                   <a:ext uri="{FF2B5EF4-FFF2-40B4-BE49-F238E27FC236}">
-                    <a16:creationId xmlns:a16="http://schemas.microsoft.com/office/drawing/2014/main" xmlns="" id="{4092AC4F-7339-9B42-9A7F-1436DD4C4AA6}"/>
+                    <a16:creationId xmlns="" xmlns:a16="http://schemas.microsoft.com/office/drawing/2014/main" id="{4092AC4F-7339-9B42-9A7F-1436DD4C4AA6}"/>
                   </a:ext>
                 </a:extLst>
               </p:cNvPr>
@@ -37510,7 +37521,7 @@
           <p:cNvPr id="60" name="Rounded Rectangle 59">
             <a:extLst>
               <a:ext uri="{FF2B5EF4-FFF2-40B4-BE49-F238E27FC236}">
-                <a16:creationId xmlns:a16="http://schemas.microsoft.com/office/drawing/2014/main" xmlns="" id="{3128ECC6-047F-DD45-AFF9-EB266766E770}"/>
+                <a16:creationId xmlns="" xmlns:a16="http://schemas.microsoft.com/office/drawing/2014/main" id="{3128ECC6-047F-DD45-AFF9-EB266766E770}"/>
               </a:ext>
             </a:extLst>
           </p:cNvPr>
@@ -38736,7 +38747,7 @@
           <p:cNvPr id="4" name="Elbow Connector 3">
             <a:extLst>
               <a:ext uri="{FF2B5EF4-FFF2-40B4-BE49-F238E27FC236}">
-                <a16:creationId xmlns:a16="http://schemas.microsoft.com/office/drawing/2014/main" xmlns="" id="{9BF3A00A-E678-994D-90B2-4880D224B0B2}"/>
+                <a16:creationId xmlns="" xmlns:a16="http://schemas.microsoft.com/office/drawing/2014/main" id="{9BF3A00A-E678-994D-90B2-4880D224B0B2}"/>
               </a:ext>
             </a:extLst>
           </p:cNvPr>
@@ -38781,7 +38792,7 @@
           <p:cNvPr id="48" name="Elbow Connector 47">
             <a:extLst>
               <a:ext uri="{FF2B5EF4-FFF2-40B4-BE49-F238E27FC236}">
-                <a16:creationId xmlns:a16="http://schemas.microsoft.com/office/drawing/2014/main" xmlns="" id="{4FE4FD2B-BE5D-7045-B933-5DA7D41C6168}"/>
+                <a16:creationId xmlns="" xmlns:a16="http://schemas.microsoft.com/office/drawing/2014/main" id="{4FE4FD2B-BE5D-7045-B933-5DA7D41C6168}"/>
               </a:ext>
             </a:extLst>
           </p:cNvPr>
@@ -38827,7 +38838,7 @@
           <p:cNvPr id="51" name="Group 50">
             <a:extLst>
               <a:ext uri="{FF2B5EF4-FFF2-40B4-BE49-F238E27FC236}">
-                <a16:creationId xmlns:a16="http://schemas.microsoft.com/office/drawing/2014/main" xmlns="" id="{B900F2F2-CE04-1E42-930A-C33ECD2E3E7A}"/>
+                <a16:creationId xmlns="" xmlns:a16="http://schemas.microsoft.com/office/drawing/2014/main" id="{B900F2F2-CE04-1E42-930A-C33ECD2E3E7A}"/>
               </a:ext>
             </a:extLst>
           </p:cNvPr>
@@ -38847,7 +38858,7 @@
             <p:cNvPr id="52" name="Picture 51">
               <a:extLst>
                 <a:ext uri="{FF2B5EF4-FFF2-40B4-BE49-F238E27FC236}">
-                  <a16:creationId xmlns:a16="http://schemas.microsoft.com/office/drawing/2014/main" xmlns="" id="{966E02F9-A3AE-D642-B86E-9F2427E9D322}"/>
+                  <a16:creationId xmlns="" xmlns:a16="http://schemas.microsoft.com/office/drawing/2014/main" id="{966E02F9-A3AE-D642-B86E-9F2427E9D322}"/>
                 </a:ext>
               </a:extLst>
             </p:cNvPr>
@@ -38883,7 +38894,7 @@
             <p:cNvPr id="61" name="TextBox 60">
               <a:extLst>
                 <a:ext uri="{FF2B5EF4-FFF2-40B4-BE49-F238E27FC236}">
-                  <a16:creationId xmlns:a16="http://schemas.microsoft.com/office/drawing/2014/main" xmlns="" id="{F736D69E-2C7D-174A-BDDD-45F1D77136D5}"/>
+                  <a16:creationId xmlns="" xmlns:a16="http://schemas.microsoft.com/office/drawing/2014/main" id="{F736D69E-2C7D-174A-BDDD-45F1D77136D5}"/>
                 </a:ext>
               </a:extLst>
             </p:cNvPr>
@@ -38937,7 +38948,7 @@
           <p:cNvPr id="62" name="TextBox 61">
             <a:extLst>
               <a:ext uri="{FF2B5EF4-FFF2-40B4-BE49-F238E27FC236}">
-                <a16:creationId xmlns:a16="http://schemas.microsoft.com/office/drawing/2014/main" xmlns="" id="{8C2367B8-8FF4-C14D-9906-82E6672825C3}"/>
+                <a16:creationId xmlns="" xmlns:a16="http://schemas.microsoft.com/office/drawing/2014/main" id="{8C2367B8-8FF4-C14D-9906-82E6672825C3}"/>
               </a:ext>
             </a:extLst>
           </p:cNvPr>
@@ -38982,7 +38993,7 @@
           <p:cNvPr id="63" name="Group 62">
             <a:extLst>
               <a:ext uri="{FF2B5EF4-FFF2-40B4-BE49-F238E27FC236}">
-                <a16:creationId xmlns:a16="http://schemas.microsoft.com/office/drawing/2014/main" xmlns="" id="{E6A58DE0-E76D-AE4C-8448-2581641B413D}"/>
+                <a16:creationId xmlns="" xmlns:a16="http://schemas.microsoft.com/office/drawing/2014/main" id="{E6A58DE0-E76D-AE4C-8448-2581641B413D}"/>
               </a:ext>
             </a:extLst>
           </p:cNvPr>
@@ -39002,7 +39013,7 @@
             <p:cNvPr id="64" name="Picture 63">
               <a:extLst>
                 <a:ext uri="{FF2B5EF4-FFF2-40B4-BE49-F238E27FC236}">
-                  <a16:creationId xmlns:a16="http://schemas.microsoft.com/office/drawing/2014/main" xmlns="" id="{5F241796-8FAA-DC4C-9D1D-62BFDCEEE94A}"/>
+                  <a16:creationId xmlns="" xmlns:a16="http://schemas.microsoft.com/office/drawing/2014/main" id="{5F241796-8FAA-DC4C-9D1D-62BFDCEEE94A}"/>
                 </a:ext>
               </a:extLst>
             </p:cNvPr>
@@ -39038,7 +39049,7 @@
             <p:cNvPr id="65" name="TextBox 64">
               <a:extLst>
                 <a:ext uri="{FF2B5EF4-FFF2-40B4-BE49-F238E27FC236}">
-                  <a16:creationId xmlns:a16="http://schemas.microsoft.com/office/drawing/2014/main" xmlns="" id="{D6F77734-4A20-CC47-84FE-6B403517D31D}"/>
+                  <a16:creationId xmlns="" xmlns:a16="http://schemas.microsoft.com/office/drawing/2014/main" id="{D6F77734-4A20-CC47-84FE-6B403517D31D}"/>
                 </a:ext>
               </a:extLst>
             </p:cNvPr>
@@ -39092,7 +39103,7 @@
           <p:cNvPr id="67" name="TextBox 66">
             <a:extLst>
               <a:ext uri="{FF2B5EF4-FFF2-40B4-BE49-F238E27FC236}">
-                <a16:creationId xmlns:a16="http://schemas.microsoft.com/office/drawing/2014/main" xmlns="" id="{C2DF5CDF-C171-D841-8B26-0F42C21B0110}"/>
+                <a16:creationId xmlns="" xmlns:a16="http://schemas.microsoft.com/office/drawing/2014/main" id="{C2DF5CDF-C171-D841-8B26-0F42C21B0110}"/>
               </a:ext>
             </a:extLst>
           </p:cNvPr>
@@ -39137,7 +39148,7 @@
           <p:cNvPr id="68" name="Elbow Connector 67">
             <a:extLst>
               <a:ext uri="{FF2B5EF4-FFF2-40B4-BE49-F238E27FC236}">
-                <a16:creationId xmlns:a16="http://schemas.microsoft.com/office/drawing/2014/main" xmlns="" id="{D130680C-7F81-8742-8D25-543F68518EC8}"/>
+                <a16:creationId xmlns="" xmlns:a16="http://schemas.microsoft.com/office/drawing/2014/main" id="{D130680C-7F81-8742-8D25-543F68518EC8}"/>
               </a:ext>
             </a:extLst>
           </p:cNvPr>
@@ -39183,7 +39194,7 @@
           <p:cNvPr id="69" name="Elbow Connector 68">
             <a:extLst>
               <a:ext uri="{FF2B5EF4-FFF2-40B4-BE49-F238E27FC236}">
-                <a16:creationId xmlns:a16="http://schemas.microsoft.com/office/drawing/2014/main" xmlns="" id="{3F54C29F-0070-7040-A58D-BB4C50958E8D}"/>
+                <a16:creationId xmlns="" xmlns:a16="http://schemas.microsoft.com/office/drawing/2014/main" id="{3F54C29F-0070-7040-A58D-BB4C50958E8D}"/>
               </a:ext>
             </a:extLst>
           </p:cNvPr>
@@ -39229,7 +39240,7 @@
           <p:cNvPr id="71" name="Group 70">
             <a:extLst>
               <a:ext uri="{FF2B5EF4-FFF2-40B4-BE49-F238E27FC236}">
-                <a16:creationId xmlns:a16="http://schemas.microsoft.com/office/drawing/2014/main" xmlns="" id="{D2D7E322-4217-344A-A21C-C074FADB1E2E}"/>
+                <a16:creationId xmlns="" xmlns:a16="http://schemas.microsoft.com/office/drawing/2014/main" id="{D2D7E322-4217-344A-A21C-C074FADB1E2E}"/>
               </a:ext>
             </a:extLst>
           </p:cNvPr>
@@ -39249,7 +39260,7 @@
             <p:cNvPr id="72" name="Picture 71">
               <a:extLst>
                 <a:ext uri="{FF2B5EF4-FFF2-40B4-BE49-F238E27FC236}">
-                  <a16:creationId xmlns:a16="http://schemas.microsoft.com/office/drawing/2014/main" xmlns="" id="{5588C56D-834F-4444-998B-991896D291C5}"/>
+                  <a16:creationId xmlns="" xmlns:a16="http://schemas.microsoft.com/office/drawing/2014/main" id="{5588C56D-834F-4444-998B-991896D291C5}"/>
                 </a:ext>
               </a:extLst>
             </p:cNvPr>
@@ -39285,7 +39296,7 @@
             <p:cNvPr id="73" name="TextBox 72">
               <a:extLst>
                 <a:ext uri="{FF2B5EF4-FFF2-40B4-BE49-F238E27FC236}">
-                  <a16:creationId xmlns:a16="http://schemas.microsoft.com/office/drawing/2014/main" xmlns="" id="{24BE9B21-5C4F-B44C-9FCA-B35F5D19A793}"/>
+                  <a16:creationId xmlns="" xmlns:a16="http://schemas.microsoft.com/office/drawing/2014/main" id="{24BE9B21-5C4F-B44C-9FCA-B35F5D19A793}"/>
                 </a:ext>
               </a:extLst>
             </p:cNvPr>
@@ -39339,7 +39350,7 @@
           <p:cNvPr id="70" name="Picture 69">
             <a:extLst>
               <a:ext uri="{FF2B5EF4-FFF2-40B4-BE49-F238E27FC236}">
-                <a16:creationId xmlns:a16="http://schemas.microsoft.com/office/drawing/2014/main" xmlns="" id="{76D94F53-5B19-A048-8718-12B83609C0BE}"/>
+                <a16:creationId xmlns="" xmlns:a16="http://schemas.microsoft.com/office/drawing/2014/main" id="{76D94F53-5B19-A048-8718-12B83609C0BE}"/>
               </a:ext>
             </a:extLst>
           </p:cNvPr>
@@ -39376,7 +39387,7 @@
           <p:cNvPr id="74" name="Picture 73">
             <a:extLst>
               <a:ext uri="{FF2B5EF4-FFF2-40B4-BE49-F238E27FC236}">
-                <a16:creationId xmlns:a16="http://schemas.microsoft.com/office/drawing/2014/main" xmlns="" id="{177FA130-DC49-A448-904E-3E8BB9C931E0}"/>
+                <a16:creationId xmlns="" xmlns:a16="http://schemas.microsoft.com/office/drawing/2014/main" id="{177FA130-DC49-A448-904E-3E8BB9C931E0}"/>
               </a:ext>
             </a:extLst>
           </p:cNvPr>
@@ -39412,7 +39423,7 @@
           <p:cNvPr id="75" name="Picture 74">
             <a:extLst>
               <a:ext uri="{FF2B5EF4-FFF2-40B4-BE49-F238E27FC236}">
-                <a16:creationId xmlns:a16="http://schemas.microsoft.com/office/drawing/2014/main" xmlns="" id="{C5E61500-E27A-8F49-9B33-7B77C86330B2}"/>
+                <a16:creationId xmlns="" xmlns:a16="http://schemas.microsoft.com/office/drawing/2014/main" id="{C5E61500-E27A-8F49-9B33-7B77C86330B2}"/>
               </a:ext>
             </a:extLst>
           </p:cNvPr>
@@ -39448,7 +39459,7 @@
           <p:cNvPr id="76" name="Picture 75">
             <a:extLst>
               <a:ext uri="{FF2B5EF4-FFF2-40B4-BE49-F238E27FC236}">
-                <a16:creationId xmlns:a16="http://schemas.microsoft.com/office/drawing/2014/main" xmlns="" id="{9A5F04A1-1861-C544-ACF4-E12A1C0B82C2}"/>
+                <a16:creationId xmlns="" xmlns:a16="http://schemas.microsoft.com/office/drawing/2014/main" id="{9A5F04A1-1861-C544-ACF4-E12A1C0B82C2}"/>
               </a:ext>
             </a:extLst>
           </p:cNvPr>
@@ -39484,7 +39495,7 @@
           <p:cNvPr id="77" name="Picture 76">
             <a:extLst>
               <a:ext uri="{FF2B5EF4-FFF2-40B4-BE49-F238E27FC236}">
-                <a16:creationId xmlns:a16="http://schemas.microsoft.com/office/drawing/2014/main" xmlns="" id="{57CCBAC6-6374-F649-9967-391301B70798}"/>
+                <a16:creationId xmlns="" xmlns:a16="http://schemas.microsoft.com/office/drawing/2014/main" id="{57CCBAC6-6374-F649-9967-391301B70798}"/>
               </a:ext>
             </a:extLst>
           </p:cNvPr>
@@ -39521,7 +39532,7 @@
           <p:cNvPr id="78" name="Picture 77">
             <a:extLst>
               <a:ext uri="{FF2B5EF4-FFF2-40B4-BE49-F238E27FC236}">
-                <a16:creationId xmlns:a16="http://schemas.microsoft.com/office/drawing/2014/main" xmlns="" id="{2D1BEC65-191A-5C4F-837E-143648A4F324}"/>
+                <a16:creationId xmlns="" xmlns:a16="http://schemas.microsoft.com/office/drawing/2014/main" id="{2D1BEC65-191A-5C4F-837E-143648A4F324}"/>
               </a:ext>
             </a:extLst>
           </p:cNvPr>
@@ -39557,7 +39568,7 @@
           <p:cNvPr id="79" name="Picture 78">
             <a:extLst>
               <a:ext uri="{FF2B5EF4-FFF2-40B4-BE49-F238E27FC236}">
-                <a16:creationId xmlns:a16="http://schemas.microsoft.com/office/drawing/2014/main" xmlns="" id="{44A47E78-0C66-014E-9729-D186F18C00A8}"/>
+                <a16:creationId xmlns="" xmlns:a16="http://schemas.microsoft.com/office/drawing/2014/main" id="{44A47E78-0C66-014E-9729-D186F18C00A8}"/>
               </a:ext>
             </a:extLst>
           </p:cNvPr>
@@ -39623,7 +39634,7 @@
           <p:cNvPr id="37" name="Snip Same Side Corner Rectangle 93">
             <a:extLst>
               <a:ext uri="{FF2B5EF4-FFF2-40B4-BE49-F238E27FC236}">
-                <a16:creationId xmlns:a16="http://schemas.microsoft.com/office/drawing/2014/main" xmlns="" id="{4DB39AD4-880D-A643-9E5D-692F846ECDDD}"/>
+                <a16:creationId xmlns="" xmlns:a16="http://schemas.microsoft.com/office/drawing/2014/main" id="{4DB39AD4-880D-A643-9E5D-692F846ECDDD}"/>
               </a:ext>
             </a:extLst>
           </p:cNvPr>
@@ -40852,7 +40863,7 @@
           <p:cNvPr id="4" name="Elbow Connector 3">
             <a:extLst>
               <a:ext uri="{FF2B5EF4-FFF2-40B4-BE49-F238E27FC236}">
-                <a16:creationId xmlns:a16="http://schemas.microsoft.com/office/drawing/2014/main" xmlns="" id="{9BF3A00A-E678-994D-90B2-4880D224B0B2}"/>
+                <a16:creationId xmlns="" xmlns:a16="http://schemas.microsoft.com/office/drawing/2014/main" id="{9BF3A00A-E678-994D-90B2-4880D224B0B2}"/>
               </a:ext>
             </a:extLst>
           </p:cNvPr>
@@ -40897,7 +40908,7 @@
           <p:cNvPr id="48" name="Elbow Connector 47">
             <a:extLst>
               <a:ext uri="{FF2B5EF4-FFF2-40B4-BE49-F238E27FC236}">
-                <a16:creationId xmlns:a16="http://schemas.microsoft.com/office/drawing/2014/main" xmlns="" id="{4FE4FD2B-BE5D-7045-B933-5DA7D41C6168}"/>
+                <a16:creationId xmlns="" xmlns:a16="http://schemas.microsoft.com/office/drawing/2014/main" id="{4FE4FD2B-BE5D-7045-B933-5DA7D41C6168}"/>
               </a:ext>
             </a:extLst>
           </p:cNvPr>
@@ -40943,7 +40954,7 @@
           <p:cNvPr id="51" name="Group 50">
             <a:extLst>
               <a:ext uri="{FF2B5EF4-FFF2-40B4-BE49-F238E27FC236}">
-                <a16:creationId xmlns:a16="http://schemas.microsoft.com/office/drawing/2014/main" xmlns="" id="{B900F2F2-CE04-1E42-930A-C33ECD2E3E7A}"/>
+                <a16:creationId xmlns="" xmlns:a16="http://schemas.microsoft.com/office/drawing/2014/main" id="{B900F2F2-CE04-1E42-930A-C33ECD2E3E7A}"/>
               </a:ext>
             </a:extLst>
           </p:cNvPr>
@@ -40963,7 +40974,7 @@
             <p:cNvPr id="52" name="Picture 51">
               <a:extLst>
                 <a:ext uri="{FF2B5EF4-FFF2-40B4-BE49-F238E27FC236}">
-                  <a16:creationId xmlns:a16="http://schemas.microsoft.com/office/drawing/2014/main" xmlns="" id="{966E02F9-A3AE-D642-B86E-9F2427E9D322}"/>
+                  <a16:creationId xmlns="" xmlns:a16="http://schemas.microsoft.com/office/drawing/2014/main" id="{966E02F9-A3AE-D642-B86E-9F2427E9D322}"/>
                 </a:ext>
               </a:extLst>
             </p:cNvPr>
@@ -40999,7 +41010,7 @@
             <p:cNvPr id="61" name="TextBox 60">
               <a:extLst>
                 <a:ext uri="{FF2B5EF4-FFF2-40B4-BE49-F238E27FC236}">
-                  <a16:creationId xmlns:a16="http://schemas.microsoft.com/office/drawing/2014/main" xmlns="" id="{F736D69E-2C7D-174A-BDDD-45F1D77136D5}"/>
+                  <a16:creationId xmlns="" xmlns:a16="http://schemas.microsoft.com/office/drawing/2014/main" id="{F736D69E-2C7D-174A-BDDD-45F1D77136D5}"/>
                 </a:ext>
               </a:extLst>
             </p:cNvPr>
@@ -41053,7 +41064,7 @@
           <p:cNvPr id="62" name="TextBox 61">
             <a:extLst>
               <a:ext uri="{FF2B5EF4-FFF2-40B4-BE49-F238E27FC236}">
-                <a16:creationId xmlns:a16="http://schemas.microsoft.com/office/drawing/2014/main" xmlns="" id="{8C2367B8-8FF4-C14D-9906-82E6672825C3}"/>
+                <a16:creationId xmlns="" xmlns:a16="http://schemas.microsoft.com/office/drawing/2014/main" id="{8C2367B8-8FF4-C14D-9906-82E6672825C3}"/>
               </a:ext>
             </a:extLst>
           </p:cNvPr>
@@ -41098,7 +41109,7 @@
           <p:cNvPr id="63" name="Group 62">
             <a:extLst>
               <a:ext uri="{FF2B5EF4-FFF2-40B4-BE49-F238E27FC236}">
-                <a16:creationId xmlns:a16="http://schemas.microsoft.com/office/drawing/2014/main" xmlns="" id="{E6A58DE0-E76D-AE4C-8448-2581641B413D}"/>
+                <a16:creationId xmlns="" xmlns:a16="http://schemas.microsoft.com/office/drawing/2014/main" id="{E6A58DE0-E76D-AE4C-8448-2581641B413D}"/>
               </a:ext>
             </a:extLst>
           </p:cNvPr>
@@ -41118,7 +41129,7 @@
             <p:cNvPr id="64" name="Picture 63">
               <a:extLst>
                 <a:ext uri="{FF2B5EF4-FFF2-40B4-BE49-F238E27FC236}">
-                  <a16:creationId xmlns:a16="http://schemas.microsoft.com/office/drawing/2014/main" xmlns="" id="{5F241796-8FAA-DC4C-9D1D-62BFDCEEE94A}"/>
+                  <a16:creationId xmlns="" xmlns:a16="http://schemas.microsoft.com/office/drawing/2014/main" id="{5F241796-8FAA-DC4C-9D1D-62BFDCEEE94A}"/>
                 </a:ext>
               </a:extLst>
             </p:cNvPr>
@@ -41154,7 +41165,7 @@
             <p:cNvPr id="65" name="TextBox 64">
               <a:extLst>
                 <a:ext uri="{FF2B5EF4-FFF2-40B4-BE49-F238E27FC236}">
-                  <a16:creationId xmlns:a16="http://schemas.microsoft.com/office/drawing/2014/main" xmlns="" id="{D6F77734-4A20-CC47-84FE-6B403517D31D}"/>
+                  <a16:creationId xmlns="" xmlns:a16="http://schemas.microsoft.com/office/drawing/2014/main" id="{D6F77734-4A20-CC47-84FE-6B403517D31D}"/>
                 </a:ext>
               </a:extLst>
             </p:cNvPr>
@@ -41208,7 +41219,7 @@
           <p:cNvPr id="67" name="TextBox 66">
             <a:extLst>
               <a:ext uri="{FF2B5EF4-FFF2-40B4-BE49-F238E27FC236}">
-                <a16:creationId xmlns:a16="http://schemas.microsoft.com/office/drawing/2014/main" xmlns="" id="{C2DF5CDF-C171-D841-8B26-0F42C21B0110}"/>
+                <a16:creationId xmlns="" xmlns:a16="http://schemas.microsoft.com/office/drawing/2014/main" id="{C2DF5CDF-C171-D841-8B26-0F42C21B0110}"/>
               </a:ext>
             </a:extLst>
           </p:cNvPr>
@@ -41253,7 +41264,7 @@
           <p:cNvPr id="68" name="Elbow Connector 67">
             <a:extLst>
               <a:ext uri="{FF2B5EF4-FFF2-40B4-BE49-F238E27FC236}">
-                <a16:creationId xmlns:a16="http://schemas.microsoft.com/office/drawing/2014/main" xmlns="" id="{D130680C-7F81-8742-8D25-543F68518EC8}"/>
+                <a16:creationId xmlns="" xmlns:a16="http://schemas.microsoft.com/office/drawing/2014/main" id="{D130680C-7F81-8742-8D25-543F68518EC8}"/>
               </a:ext>
             </a:extLst>
           </p:cNvPr>
@@ -41299,7 +41310,7 @@
           <p:cNvPr id="69" name="Elbow Connector 68">
             <a:extLst>
               <a:ext uri="{FF2B5EF4-FFF2-40B4-BE49-F238E27FC236}">
-                <a16:creationId xmlns:a16="http://schemas.microsoft.com/office/drawing/2014/main" xmlns="" id="{3F54C29F-0070-7040-A58D-BB4C50958E8D}"/>
+                <a16:creationId xmlns="" xmlns:a16="http://schemas.microsoft.com/office/drawing/2014/main" id="{3F54C29F-0070-7040-A58D-BB4C50958E8D}"/>
               </a:ext>
             </a:extLst>
           </p:cNvPr>
@@ -41345,7 +41356,7 @@
           <p:cNvPr id="71" name="Group 70">
             <a:extLst>
               <a:ext uri="{FF2B5EF4-FFF2-40B4-BE49-F238E27FC236}">
-                <a16:creationId xmlns:a16="http://schemas.microsoft.com/office/drawing/2014/main" xmlns="" id="{D2D7E322-4217-344A-A21C-C074FADB1E2E}"/>
+                <a16:creationId xmlns="" xmlns:a16="http://schemas.microsoft.com/office/drawing/2014/main" id="{D2D7E322-4217-344A-A21C-C074FADB1E2E}"/>
               </a:ext>
             </a:extLst>
           </p:cNvPr>
@@ -41365,7 +41376,7 @@
             <p:cNvPr id="72" name="Picture 71">
               <a:extLst>
                 <a:ext uri="{FF2B5EF4-FFF2-40B4-BE49-F238E27FC236}">
-                  <a16:creationId xmlns:a16="http://schemas.microsoft.com/office/drawing/2014/main" xmlns="" id="{5588C56D-834F-4444-998B-991896D291C5}"/>
+                  <a16:creationId xmlns="" xmlns:a16="http://schemas.microsoft.com/office/drawing/2014/main" id="{5588C56D-834F-4444-998B-991896D291C5}"/>
                 </a:ext>
               </a:extLst>
             </p:cNvPr>
@@ -41401,7 +41412,7 @@
             <p:cNvPr id="73" name="TextBox 72">
               <a:extLst>
                 <a:ext uri="{FF2B5EF4-FFF2-40B4-BE49-F238E27FC236}">
-                  <a16:creationId xmlns:a16="http://schemas.microsoft.com/office/drawing/2014/main" xmlns="" id="{24BE9B21-5C4F-B44C-9FCA-B35F5D19A793}"/>
+                  <a16:creationId xmlns="" xmlns:a16="http://schemas.microsoft.com/office/drawing/2014/main" id="{24BE9B21-5C4F-B44C-9FCA-B35F5D19A793}"/>
                 </a:ext>
               </a:extLst>
             </p:cNvPr>
@@ -41455,7 +41466,7 @@
           <p:cNvPr id="102" name="Snip Same Side Corner Rectangle 93">
             <a:extLst>
               <a:ext uri="{FF2B5EF4-FFF2-40B4-BE49-F238E27FC236}">
-                <a16:creationId xmlns:a16="http://schemas.microsoft.com/office/drawing/2014/main" xmlns="" id="{1231F8B0-03E6-9B42-B8A7-9E649312935B}"/>
+                <a16:creationId xmlns="" xmlns:a16="http://schemas.microsoft.com/office/drawing/2014/main" id="{1231F8B0-03E6-9B42-B8A7-9E649312935B}"/>
               </a:ext>
             </a:extLst>
           </p:cNvPr>
@@ -41521,7 +41532,7 @@
           <p:cNvPr id="103" name="Rounded Rectangle 102">
             <a:extLst>
               <a:ext uri="{FF2B5EF4-FFF2-40B4-BE49-F238E27FC236}">
-                <a16:creationId xmlns:a16="http://schemas.microsoft.com/office/drawing/2014/main" xmlns="" id="{7AE1F057-6859-CA4E-BABB-27767561BC21}"/>
+                <a16:creationId xmlns="" xmlns:a16="http://schemas.microsoft.com/office/drawing/2014/main" id="{7AE1F057-6859-CA4E-BABB-27767561BC21}"/>
               </a:ext>
             </a:extLst>
           </p:cNvPr>
@@ -41682,7 +41693,7 @@
           <p:cNvPr id="104" name="Rounded Rectangle 103">
             <a:extLst>
               <a:ext uri="{FF2B5EF4-FFF2-40B4-BE49-F238E27FC236}">
-                <a16:creationId xmlns:a16="http://schemas.microsoft.com/office/drawing/2014/main" xmlns="" id="{874826BF-06E5-CA49-A3C6-B2B883DD9573}"/>
+                <a16:creationId xmlns="" xmlns:a16="http://schemas.microsoft.com/office/drawing/2014/main" id="{874826BF-06E5-CA49-A3C6-B2B883DD9573}"/>
               </a:ext>
             </a:extLst>
           </p:cNvPr>
@@ -41832,7 +41843,7 @@
           <p:cNvPr id="105" name="Rounded Rectangle 104">
             <a:extLst>
               <a:ext uri="{FF2B5EF4-FFF2-40B4-BE49-F238E27FC236}">
-                <a16:creationId xmlns:a16="http://schemas.microsoft.com/office/drawing/2014/main" xmlns="" id="{0419E6D4-A845-4A4D-B7ED-47A194850051}"/>
+                <a16:creationId xmlns="" xmlns:a16="http://schemas.microsoft.com/office/drawing/2014/main" id="{0419E6D4-A845-4A4D-B7ED-47A194850051}"/>
               </a:ext>
             </a:extLst>
           </p:cNvPr>
@@ -41895,7 +41906,7 @@
           <p:cNvPr id="106" name="Rounded Rectangle 105">
             <a:extLst>
               <a:ext uri="{FF2B5EF4-FFF2-40B4-BE49-F238E27FC236}">
-                <a16:creationId xmlns:a16="http://schemas.microsoft.com/office/drawing/2014/main" xmlns="" id="{4A49D161-00C1-3040-9B62-9DCE53995EB7}"/>
+                <a16:creationId xmlns="" xmlns:a16="http://schemas.microsoft.com/office/drawing/2014/main" id="{4A49D161-00C1-3040-9B62-9DCE53995EB7}"/>
               </a:ext>
             </a:extLst>
           </p:cNvPr>
@@ -41976,7 +41987,7 @@
           <p:cNvPr id="107" name="Rounded Rectangle 106">
             <a:extLst>
               <a:ext uri="{FF2B5EF4-FFF2-40B4-BE49-F238E27FC236}">
-                <a16:creationId xmlns:a16="http://schemas.microsoft.com/office/drawing/2014/main" xmlns="" id="{63A00722-E3BE-C345-AB33-39A8B24634EB}"/>
+                <a16:creationId xmlns="" xmlns:a16="http://schemas.microsoft.com/office/drawing/2014/main" id="{63A00722-E3BE-C345-AB33-39A8B24634EB}"/>
               </a:ext>
             </a:extLst>
           </p:cNvPr>
@@ -42061,7 +42072,7 @@
           <p:cNvPr id="108" name="Rounded Rectangle 107">
             <a:extLst>
               <a:ext uri="{FF2B5EF4-FFF2-40B4-BE49-F238E27FC236}">
-                <a16:creationId xmlns:a16="http://schemas.microsoft.com/office/drawing/2014/main" xmlns="" id="{42839603-B502-F44A-8418-A8802901A911}"/>
+                <a16:creationId xmlns="" xmlns:a16="http://schemas.microsoft.com/office/drawing/2014/main" id="{42839603-B502-F44A-8418-A8802901A911}"/>
               </a:ext>
             </a:extLst>
           </p:cNvPr>
@@ -42125,7 +42136,7 @@
           <p:cNvPr id="109" name="Group 108">
             <a:extLst>
               <a:ext uri="{FF2B5EF4-FFF2-40B4-BE49-F238E27FC236}">
-                <a16:creationId xmlns:a16="http://schemas.microsoft.com/office/drawing/2014/main" xmlns="" id="{B831825B-268B-CC4F-BEE2-47BEEEE7747D}"/>
+                <a16:creationId xmlns="" xmlns:a16="http://schemas.microsoft.com/office/drawing/2014/main" id="{B831825B-268B-CC4F-BEE2-47BEEEE7747D}"/>
               </a:ext>
             </a:extLst>
           </p:cNvPr>
@@ -42145,7 +42156,7 @@
             <p:cNvPr id="110" name="Bande diagonale 197">
               <a:extLst>
                 <a:ext uri="{FF2B5EF4-FFF2-40B4-BE49-F238E27FC236}">
-                  <a16:creationId xmlns:a16="http://schemas.microsoft.com/office/drawing/2014/main" xmlns="" id="{1654EA13-0FCD-CF4D-AC66-0234ECD24397}"/>
+                  <a16:creationId xmlns="" xmlns:a16="http://schemas.microsoft.com/office/drawing/2014/main" id="{1654EA13-0FCD-CF4D-AC66-0234ECD24397}"/>
                 </a:ext>
               </a:extLst>
             </p:cNvPr>
@@ -42210,7 +42221,7 @@
             <p:cNvPr id="111" name="ZoneTexte 198">
               <a:extLst>
                 <a:ext uri="{FF2B5EF4-FFF2-40B4-BE49-F238E27FC236}">
-                  <a16:creationId xmlns:a16="http://schemas.microsoft.com/office/drawing/2014/main" xmlns="" id="{4A13AB44-521D-7F4A-8563-2508B04DAFB7}"/>
+                  <a16:creationId xmlns="" xmlns:a16="http://schemas.microsoft.com/office/drawing/2014/main" id="{4A13AB44-521D-7F4A-8563-2508B04DAFB7}"/>
                 </a:ext>
               </a:extLst>
             </p:cNvPr>
@@ -42256,7 +42267,7 @@
           <p:cNvPr id="112" name="Rectangle 111">
             <a:extLst>
               <a:ext uri="{FF2B5EF4-FFF2-40B4-BE49-F238E27FC236}">
-                <a16:creationId xmlns:a16="http://schemas.microsoft.com/office/drawing/2014/main" xmlns="" id="{A987477C-DE1D-5E45-84C8-FCA488DB590A}"/>
+                <a16:creationId xmlns="" xmlns:a16="http://schemas.microsoft.com/office/drawing/2014/main" id="{A987477C-DE1D-5E45-84C8-FCA488DB590A}"/>
               </a:ext>
             </a:extLst>
           </p:cNvPr>
@@ -42319,7 +42330,7 @@
           <p:cNvPr id="113" name="Picture 112">
             <a:extLst>
               <a:ext uri="{FF2B5EF4-FFF2-40B4-BE49-F238E27FC236}">
-                <a16:creationId xmlns:a16="http://schemas.microsoft.com/office/drawing/2014/main" xmlns="" id="{3BBC3C30-2A76-3A46-B51D-46ADC3B42C6E}"/>
+                <a16:creationId xmlns="" xmlns:a16="http://schemas.microsoft.com/office/drawing/2014/main" id="{3BBC3C30-2A76-3A46-B51D-46ADC3B42C6E}"/>
               </a:ext>
             </a:extLst>
           </p:cNvPr>
@@ -42355,7 +42366,7 @@
           <p:cNvPr id="114" name="Rectangle 113">
             <a:extLst>
               <a:ext uri="{FF2B5EF4-FFF2-40B4-BE49-F238E27FC236}">
-                <a16:creationId xmlns:a16="http://schemas.microsoft.com/office/drawing/2014/main" xmlns="" id="{743D34B8-87EB-2E41-92C7-AF2F30513E62}"/>
+                <a16:creationId xmlns="" xmlns:a16="http://schemas.microsoft.com/office/drawing/2014/main" id="{743D34B8-87EB-2E41-92C7-AF2F30513E62}"/>
               </a:ext>
             </a:extLst>
           </p:cNvPr>
@@ -42397,7 +42408,7 @@
           <p:cNvPr id="115" name="ZoneTexte 152">
             <a:extLst>
               <a:ext uri="{FF2B5EF4-FFF2-40B4-BE49-F238E27FC236}">
-                <a16:creationId xmlns:a16="http://schemas.microsoft.com/office/drawing/2014/main" xmlns="" id="{FABB62C5-9BC2-094E-8EEA-C0AB0AF45408}"/>
+                <a16:creationId xmlns="" xmlns:a16="http://schemas.microsoft.com/office/drawing/2014/main" id="{FABB62C5-9BC2-094E-8EEA-C0AB0AF45408}"/>
               </a:ext>
             </a:extLst>
           </p:cNvPr>
@@ -42439,7 +42450,7 @@
           <p:cNvPr id="116" name="Rounded Rectangle 115">
             <a:extLst>
               <a:ext uri="{FF2B5EF4-FFF2-40B4-BE49-F238E27FC236}">
-                <a16:creationId xmlns:a16="http://schemas.microsoft.com/office/drawing/2014/main" xmlns="" id="{2D86F9DA-2469-D64C-808F-74CFBAE2F36F}"/>
+                <a16:creationId xmlns="" xmlns:a16="http://schemas.microsoft.com/office/drawing/2014/main" id="{2D86F9DA-2469-D64C-808F-74CFBAE2F36F}"/>
               </a:ext>
             </a:extLst>
           </p:cNvPr>
@@ -42560,7 +42571,7 @@
           <p:cNvPr id="117" name="Rounded Rectangle 116">
             <a:extLst>
               <a:ext uri="{FF2B5EF4-FFF2-40B4-BE49-F238E27FC236}">
-                <a16:creationId xmlns:a16="http://schemas.microsoft.com/office/drawing/2014/main" xmlns="" id="{25E0A7D2-9FA0-6840-BFFB-AF61AA3E1924}"/>
+                <a16:creationId xmlns="" xmlns:a16="http://schemas.microsoft.com/office/drawing/2014/main" id="{25E0A7D2-9FA0-6840-BFFB-AF61AA3E1924}"/>
               </a:ext>
             </a:extLst>
           </p:cNvPr>
@@ -42735,7 +42746,7 @@
           <p:cNvPr id="118" name="TextBox 117">
             <a:extLst>
               <a:ext uri="{FF2B5EF4-FFF2-40B4-BE49-F238E27FC236}">
-                <a16:creationId xmlns:a16="http://schemas.microsoft.com/office/drawing/2014/main" xmlns="" id="{71CB6603-D904-4247-BB96-6E84E326872A}"/>
+                <a16:creationId xmlns="" xmlns:a16="http://schemas.microsoft.com/office/drawing/2014/main" id="{71CB6603-D904-4247-BB96-6E84E326872A}"/>
               </a:ext>
             </a:extLst>
           </p:cNvPr>
@@ -42780,7 +42791,7 @@
           <p:cNvPr id="119" name="Elbow Connector 118">
             <a:extLst>
               <a:ext uri="{FF2B5EF4-FFF2-40B4-BE49-F238E27FC236}">
-                <a16:creationId xmlns:a16="http://schemas.microsoft.com/office/drawing/2014/main" xmlns="" id="{7E74EBCE-5BC9-9F42-B413-AD1F04DDF54F}"/>
+                <a16:creationId xmlns="" xmlns:a16="http://schemas.microsoft.com/office/drawing/2014/main" id="{7E74EBCE-5BC9-9F42-B413-AD1F04DDF54F}"/>
               </a:ext>
             </a:extLst>
           </p:cNvPr>
@@ -42825,7 +42836,7 @@
           <p:cNvPr id="120" name="Elbow Connector 119">
             <a:extLst>
               <a:ext uri="{FF2B5EF4-FFF2-40B4-BE49-F238E27FC236}">
-                <a16:creationId xmlns:a16="http://schemas.microsoft.com/office/drawing/2014/main" xmlns="" id="{C65D2CAC-B9AF-C346-AEAE-5D698CC62CBF}"/>
+                <a16:creationId xmlns="" xmlns:a16="http://schemas.microsoft.com/office/drawing/2014/main" id="{C65D2CAC-B9AF-C346-AEAE-5D698CC62CBF}"/>
               </a:ext>
             </a:extLst>
           </p:cNvPr>
@@ -42871,7 +42882,7 @@
           <p:cNvPr id="121" name="Group 120">
             <a:extLst>
               <a:ext uri="{FF2B5EF4-FFF2-40B4-BE49-F238E27FC236}">
-                <a16:creationId xmlns:a16="http://schemas.microsoft.com/office/drawing/2014/main" xmlns="" id="{9B1A5BCA-1C14-9648-89C6-26DC43FA0778}"/>
+                <a16:creationId xmlns="" xmlns:a16="http://schemas.microsoft.com/office/drawing/2014/main" id="{9B1A5BCA-1C14-9648-89C6-26DC43FA0778}"/>
               </a:ext>
             </a:extLst>
           </p:cNvPr>
@@ -42891,7 +42902,7 @@
             <p:cNvPr id="122" name="Picture 121">
               <a:extLst>
                 <a:ext uri="{FF2B5EF4-FFF2-40B4-BE49-F238E27FC236}">
-                  <a16:creationId xmlns:a16="http://schemas.microsoft.com/office/drawing/2014/main" xmlns="" id="{E1B1787F-259E-5140-90CE-EBAC61813B35}"/>
+                  <a16:creationId xmlns="" xmlns:a16="http://schemas.microsoft.com/office/drawing/2014/main" id="{E1B1787F-259E-5140-90CE-EBAC61813B35}"/>
                 </a:ext>
               </a:extLst>
             </p:cNvPr>
@@ -42927,7 +42938,7 @@
             <p:cNvPr id="123" name="TextBox 122">
               <a:extLst>
                 <a:ext uri="{FF2B5EF4-FFF2-40B4-BE49-F238E27FC236}">
-                  <a16:creationId xmlns:a16="http://schemas.microsoft.com/office/drawing/2014/main" xmlns="" id="{8DB2CA10-2698-7E41-8917-4533A3B6C014}"/>
+                  <a16:creationId xmlns="" xmlns:a16="http://schemas.microsoft.com/office/drawing/2014/main" id="{8DB2CA10-2698-7E41-8917-4533A3B6C014}"/>
                 </a:ext>
               </a:extLst>
             </p:cNvPr>
@@ -42981,7 +42992,7 @@
           <p:cNvPr id="124" name="TextBox 123">
             <a:extLst>
               <a:ext uri="{FF2B5EF4-FFF2-40B4-BE49-F238E27FC236}">
-                <a16:creationId xmlns:a16="http://schemas.microsoft.com/office/drawing/2014/main" xmlns="" id="{D7F53C2A-0AD9-6E40-9EDB-948ABB70BC0C}"/>
+                <a16:creationId xmlns="" xmlns:a16="http://schemas.microsoft.com/office/drawing/2014/main" id="{D7F53C2A-0AD9-6E40-9EDB-948ABB70BC0C}"/>
               </a:ext>
             </a:extLst>
           </p:cNvPr>
@@ -43026,7 +43037,7 @@
           <p:cNvPr id="125" name="Group 124">
             <a:extLst>
               <a:ext uri="{FF2B5EF4-FFF2-40B4-BE49-F238E27FC236}">
-                <a16:creationId xmlns:a16="http://schemas.microsoft.com/office/drawing/2014/main" xmlns="" id="{75BF4010-A1C3-174F-8F91-41595C23721E}"/>
+                <a16:creationId xmlns="" xmlns:a16="http://schemas.microsoft.com/office/drawing/2014/main" id="{75BF4010-A1C3-174F-8F91-41595C23721E}"/>
               </a:ext>
             </a:extLst>
           </p:cNvPr>
@@ -43046,7 +43057,7 @@
             <p:cNvPr id="126" name="Picture 125">
               <a:extLst>
                 <a:ext uri="{FF2B5EF4-FFF2-40B4-BE49-F238E27FC236}">
-                  <a16:creationId xmlns:a16="http://schemas.microsoft.com/office/drawing/2014/main" xmlns="" id="{0D731BAA-0423-0F4F-9E3D-7FDF4AE452BA}"/>
+                  <a16:creationId xmlns="" xmlns:a16="http://schemas.microsoft.com/office/drawing/2014/main" id="{0D731BAA-0423-0F4F-9E3D-7FDF4AE452BA}"/>
                 </a:ext>
               </a:extLst>
             </p:cNvPr>
@@ -43082,7 +43093,7 @@
             <p:cNvPr id="127" name="TextBox 126">
               <a:extLst>
                 <a:ext uri="{FF2B5EF4-FFF2-40B4-BE49-F238E27FC236}">
-                  <a16:creationId xmlns:a16="http://schemas.microsoft.com/office/drawing/2014/main" xmlns="" id="{B37D7834-71F9-9143-BBCA-A73C1B30C25C}"/>
+                  <a16:creationId xmlns="" xmlns:a16="http://schemas.microsoft.com/office/drawing/2014/main" id="{B37D7834-71F9-9143-BBCA-A73C1B30C25C}"/>
                 </a:ext>
               </a:extLst>
             </p:cNvPr>
@@ -43136,7 +43147,7 @@
           <p:cNvPr id="128" name="TextBox 127">
             <a:extLst>
               <a:ext uri="{FF2B5EF4-FFF2-40B4-BE49-F238E27FC236}">
-                <a16:creationId xmlns:a16="http://schemas.microsoft.com/office/drawing/2014/main" xmlns="" id="{264A1003-3679-F840-B633-F9DC8BCC753B}"/>
+                <a16:creationId xmlns="" xmlns:a16="http://schemas.microsoft.com/office/drawing/2014/main" id="{264A1003-3679-F840-B633-F9DC8BCC753B}"/>
               </a:ext>
             </a:extLst>
           </p:cNvPr>
@@ -43181,7 +43192,7 @@
           <p:cNvPr id="129" name="Elbow Connector 128">
             <a:extLst>
               <a:ext uri="{FF2B5EF4-FFF2-40B4-BE49-F238E27FC236}">
-                <a16:creationId xmlns:a16="http://schemas.microsoft.com/office/drawing/2014/main" xmlns="" id="{8E94D685-E5D7-FF4B-AAA7-2468AA33E751}"/>
+                <a16:creationId xmlns="" xmlns:a16="http://schemas.microsoft.com/office/drawing/2014/main" id="{8E94D685-E5D7-FF4B-AAA7-2468AA33E751}"/>
               </a:ext>
             </a:extLst>
           </p:cNvPr>
@@ -43227,7 +43238,7 @@
           <p:cNvPr id="130" name="Elbow Connector 129">
             <a:extLst>
               <a:ext uri="{FF2B5EF4-FFF2-40B4-BE49-F238E27FC236}">
-                <a16:creationId xmlns:a16="http://schemas.microsoft.com/office/drawing/2014/main" xmlns="" id="{5BD67556-B975-5F4F-8059-4E585C692573}"/>
+                <a16:creationId xmlns="" xmlns:a16="http://schemas.microsoft.com/office/drawing/2014/main" id="{5BD67556-B975-5F4F-8059-4E585C692573}"/>
               </a:ext>
             </a:extLst>
           </p:cNvPr>
@@ -43273,7 +43284,7 @@
           <p:cNvPr id="131" name="Group 130">
             <a:extLst>
               <a:ext uri="{FF2B5EF4-FFF2-40B4-BE49-F238E27FC236}">
-                <a16:creationId xmlns:a16="http://schemas.microsoft.com/office/drawing/2014/main" xmlns="" id="{A2B6F37B-8F83-6A4A-9257-40AD506460D2}"/>
+                <a16:creationId xmlns="" xmlns:a16="http://schemas.microsoft.com/office/drawing/2014/main" id="{A2B6F37B-8F83-6A4A-9257-40AD506460D2}"/>
               </a:ext>
             </a:extLst>
           </p:cNvPr>
@@ -43293,7 +43304,7 @@
             <p:cNvPr id="132" name="Picture 131">
               <a:extLst>
                 <a:ext uri="{FF2B5EF4-FFF2-40B4-BE49-F238E27FC236}">
-                  <a16:creationId xmlns:a16="http://schemas.microsoft.com/office/drawing/2014/main" xmlns="" id="{5F58B8DD-F107-5C4A-A017-A00049422844}"/>
+                  <a16:creationId xmlns="" xmlns:a16="http://schemas.microsoft.com/office/drawing/2014/main" id="{5F58B8DD-F107-5C4A-A017-A00049422844}"/>
                 </a:ext>
               </a:extLst>
             </p:cNvPr>
@@ -43329,7 +43340,7 @@
             <p:cNvPr id="133" name="TextBox 132">
               <a:extLst>
                 <a:ext uri="{FF2B5EF4-FFF2-40B4-BE49-F238E27FC236}">
-                  <a16:creationId xmlns:a16="http://schemas.microsoft.com/office/drawing/2014/main" xmlns="" id="{86DF3AD6-B6E7-B141-8C5C-8F6DDA0ECDB1}"/>
+                  <a16:creationId xmlns="" xmlns:a16="http://schemas.microsoft.com/office/drawing/2014/main" id="{86DF3AD6-B6E7-B141-8C5C-8F6DDA0ECDB1}"/>
                 </a:ext>
               </a:extLst>
             </p:cNvPr>
@@ -43383,7 +43394,7 @@
           <p:cNvPr id="134" name="Oval 133">
             <a:extLst>
               <a:ext uri="{FF2B5EF4-FFF2-40B4-BE49-F238E27FC236}">
-                <a16:creationId xmlns:a16="http://schemas.microsoft.com/office/drawing/2014/main" xmlns="" id="{3002D2F6-A2CD-724E-AF4B-C4006A704D15}"/>
+                <a16:creationId xmlns="" xmlns:a16="http://schemas.microsoft.com/office/drawing/2014/main" id="{3002D2F6-A2CD-724E-AF4B-C4006A704D15}"/>
               </a:ext>
             </a:extLst>
           </p:cNvPr>
@@ -43437,7 +43448,7 @@
           <p:cNvPr id="135" name="Picture 134">
             <a:extLst>
               <a:ext uri="{FF2B5EF4-FFF2-40B4-BE49-F238E27FC236}">
-                <a16:creationId xmlns:a16="http://schemas.microsoft.com/office/drawing/2014/main" xmlns="" id="{DAC6A626-719B-7A4A-98F2-A543EA28702A}"/>
+                <a16:creationId xmlns="" xmlns:a16="http://schemas.microsoft.com/office/drawing/2014/main" id="{DAC6A626-719B-7A4A-98F2-A543EA28702A}"/>
               </a:ext>
             </a:extLst>
           </p:cNvPr>
@@ -43473,7 +43484,7 @@
           <p:cNvPr id="138" name="Group 137">
             <a:extLst>
               <a:ext uri="{FF2B5EF4-FFF2-40B4-BE49-F238E27FC236}">
-                <a16:creationId xmlns:a16="http://schemas.microsoft.com/office/drawing/2014/main" xmlns="" id="{74973881-42A9-5947-BCA0-0D18B3DD7777}"/>
+                <a16:creationId xmlns="" xmlns:a16="http://schemas.microsoft.com/office/drawing/2014/main" id="{74973881-42A9-5947-BCA0-0D18B3DD7777}"/>
               </a:ext>
             </a:extLst>
           </p:cNvPr>
@@ -43493,7 +43504,7 @@
             <p:cNvPr id="136" name="Picture 135">
               <a:extLst>
                 <a:ext uri="{FF2B5EF4-FFF2-40B4-BE49-F238E27FC236}">
-                  <a16:creationId xmlns:a16="http://schemas.microsoft.com/office/drawing/2014/main" xmlns="" id="{677CB0C4-EA9C-4A42-922A-032A06D95E6A}"/>
+                  <a16:creationId xmlns="" xmlns:a16="http://schemas.microsoft.com/office/drawing/2014/main" id="{677CB0C4-EA9C-4A42-922A-032A06D95E6A}"/>
                 </a:ext>
               </a:extLst>
             </p:cNvPr>
@@ -43530,7 +43541,7 @@
             <p:cNvPr id="137" name="Picture 136">
               <a:extLst>
                 <a:ext uri="{FF2B5EF4-FFF2-40B4-BE49-F238E27FC236}">
-                  <a16:creationId xmlns:a16="http://schemas.microsoft.com/office/drawing/2014/main" xmlns="" id="{BA663F4B-8689-C448-A1A9-2580E2815CD8}"/>
+                  <a16:creationId xmlns="" xmlns:a16="http://schemas.microsoft.com/office/drawing/2014/main" id="{BA663F4B-8689-C448-A1A9-2580E2815CD8}"/>
                 </a:ext>
               </a:extLst>
             </p:cNvPr>
@@ -43597,7 +43608,7 @@
           <p:cNvPr id="41" name="Snip Same Side Corner Rectangle 93">
             <a:extLst>
               <a:ext uri="{FF2B5EF4-FFF2-40B4-BE49-F238E27FC236}">
-                <a16:creationId xmlns:a16="http://schemas.microsoft.com/office/drawing/2014/main" xmlns="" id="{E4744234-A57D-EF4E-B6E5-B22707E51B10}"/>
+                <a16:creationId xmlns="" xmlns:a16="http://schemas.microsoft.com/office/drawing/2014/main" id="{E4744234-A57D-EF4E-B6E5-B22707E51B10}"/>
               </a:ext>
             </a:extLst>
           </p:cNvPr>
@@ -43667,7 +43678,7 @@
           <p:cNvPr id="95" name="Picture 94">
             <a:extLst>
               <a:ext uri="{FF2B5EF4-FFF2-40B4-BE49-F238E27FC236}">
-                <a16:creationId xmlns:a16="http://schemas.microsoft.com/office/drawing/2014/main" xmlns="" id="{1554F2BF-937A-B847-8324-69B50E36C1A0}"/>
+                <a16:creationId xmlns="" xmlns:a16="http://schemas.microsoft.com/office/drawing/2014/main" id="{1554F2BF-937A-B847-8324-69B50E36C1A0}"/>
               </a:ext>
             </a:extLst>
           </p:cNvPr>
@@ -43703,7 +43714,7 @@
           <p:cNvPr id="96" name="Rounded Rectangle 95">
             <a:extLst>
               <a:ext uri="{FF2B5EF4-FFF2-40B4-BE49-F238E27FC236}">
-                <a16:creationId xmlns:a16="http://schemas.microsoft.com/office/drawing/2014/main" xmlns="" id="{92EF0F3A-4BE4-4D4A-A9F1-8B544BD2EFD4}"/>
+                <a16:creationId xmlns="" xmlns:a16="http://schemas.microsoft.com/office/drawing/2014/main" id="{92EF0F3A-4BE4-4D4A-A9F1-8B544BD2EFD4}"/>
               </a:ext>
             </a:extLst>
           </p:cNvPr>
@@ -43864,7 +43875,7 @@
           <p:cNvPr id="97" name="Rounded Rectangle 96">
             <a:extLst>
               <a:ext uri="{FF2B5EF4-FFF2-40B4-BE49-F238E27FC236}">
-                <a16:creationId xmlns:a16="http://schemas.microsoft.com/office/drawing/2014/main" xmlns="" id="{B6C6AC9F-8A39-7E4D-B54A-17A1E0F26D47}"/>
+                <a16:creationId xmlns="" xmlns:a16="http://schemas.microsoft.com/office/drawing/2014/main" id="{B6C6AC9F-8A39-7E4D-B54A-17A1E0F26D47}"/>
               </a:ext>
             </a:extLst>
           </p:cNvPr>
@@ -44014,7 +44025,7 @@
           <p:cNvPr id="98" name="Rounded Rectangle 97">
             <a:extLst>
               <a:ext uri="{FF2B5EF4-FFF2-40B4-BE49-F238E27FC236}">
-                <a16:creationId xmlns:a16="http://schemas.microsoft.com/office/drawing/2014/main" xmlns="" id="{541B7744-1937-B34C-A46B-D20D704623F7}"/>
+                <a16:creationId xmlns="" xmlns:a16="http://schemas.microsoft.com/office/drawing/2014/main" id="{541B7744-1937-B34C-A46B-D20D704623F7}"/>
               </a:ext>
             </a:extLst>
           </p:cNvPr>
@@ -44077,7 +44088,7 @@
           <p:cNvPr id="99" name="Rounded Rectangle 98">
             <a:extLst>
               <a:ext uri="{FF2B5EF4-FFF2-40B4-BE49-F238E27FC236}">
-                <a16:creationId xmlns:a16="http://schemas.microsoft.com/office/drawing/2014/main" xmlns="" id="{DB338B07-AC25-2049-8A24-9183DE31790D}"/>
+                <a16:creationId xmlns="" xmlns:a16="http://schemas.microsoft.com/office/drawing/2014/main" id="{DB338B07-AC25-2049-8A24-9183DE31790D}"/>
               </a:ext>
             </a:extLst>
           </p:cNvPr>
@@ -44158,7 +44169,7 @@
           <p:cNvPr id="100" name="Rounded Rectangle 99">
             <a:extLst>
               <a:ext uri="{FF2B5EF4-FFF2-40B4-BE49-F238E27FC236}">
-                <a16:creationId xmlns:a16="http://schemas.microsoft.com/office/drawing/2014/main" xmlns="" id="{ADFDAFA9-27C1-CF4D-B91E-6591FAC40A25}"/>
+                <a16:creationId xmlns="" xmlns:a16="http://schemas.microsoft.com/office/drawing/2014/main" id="{ADFDAFA9-27C1-CF4D-B91E-6591FAC40A25}"/>
               </a:ext>
             </a:extLst>
           </p:cNvPr>
@@ -44243,7 +44254,7 @@
           <p:cNvPr id="101" name="Rounded Rectangle 100">
             <a:extLst>
               <a:ext uri="{FF2B5EF4-FFF2-40B4-BE49-F238E27FC236}">
-                <a16:creationId xmlns:a16="http://schemas.microsoft.com/office/drawing/2014/main" xmlns="" id="{4241E001-9F59-1F49-BEC4-1C50BD81308E}"/>
+                <a16:creationId xmlns="" xmlns:a16="http://schemas.microsoft.com/office/drawing/2014/main" id="{4241E001-9F59-1F49-BEC4-1C50BD81308E}"/>
               </a:ext>
             </a:extLst>
           </p:cNvPr>
@@ -44307,7 +44318,7 @@
           <p:cNvPr id="102" name="Group 101">
             <a:extLst>
               <a:ext uri="{FF2B5EF4-FFF2-40B4-BE49-F238E27FC236}">
-                <a16:creationId xmlns:a16="http://schemas.microsoft.com/office/drawing/2014/main" xmlns="" id="{6CAFD87D-C545-4447-90FB-95232FAB877F}"/>
+                <a16:creationId xmlns="" xmlns:a16="http://schemas.microsoft.com/office/drawing/2014/main" id="{6CAFD87D-C545-4447-90FB-95232FAB877F}"/>
               </a:ext>
             </a:extLst>
           </p:cNvPr>
@@ -44327,7 +44338,7 @@
             <p:cNvPr id="103" name="Bande diagonale 197">
               <a:extLst>
                 <a:ext uri="{FF2B5EF4-FFF2-40B4-BE49-F238E27FC236}">
-                  <a16:creationId xmlns:a16="http://schemas.microsoft.com/office/drawing/2014/main" xmlns="" id="{22B74E67-D7D4-F04A-9A55-C6471811BD30}"/>
+                  <a16:creationId xmlns="" xmlns:a16="http://schemas.microsoft.com/office/drawing/2014/main" id="{22B74E67-D7D4-F04A-9A55-C6471811BD30}"/>
                 </a:ext>
               </a:extLst>
             </p:cNvPr>
@@ -44392,7 +44403,7 @@
             <p:cNvPr id="104" name="ZoneTexte 198">
               <a:extLst>
                 <a:ext uri="{FF2B5EF4-FFF2-40B4-BE49-F238E27FC236}">
-                  <a16:creationId xmlns:a16="http://schemas.microsoft.com/office/drawing/2014/main" xmlns="" id="{E4FAF49A-138C-D542-953A-C666D49BA93B}"/>
+                  <a16:creationId xmlns="" xmlns:a16="http://schemas.microsoft.com/office/drawing/2014/main" id="{E4FAF49A-138C-D542-953A-C666D49BA93B}"/>
                 </a:ext>
               </a:extLst>
             </p:cNvPr>
@@ -44438,7 +44449,7 @@
           <p:cNvPr id="105" name="Rectangle 104">
             <a:extLst>
               <a:ext uri="{FF2B5EF4-FFF2-40B4-BE49-F238E27FC236}">
-                <a16:creationId xmlns:a16="http://schemas.microsoft.com/office/drawing/2014/main" xmlns="" id="{7419A767-967A-6D4D-9E53-8F9552A49546}"/>
+                <a16:creationId xmlns="" xmlns:a16="http://schemas.microsoft.com/office/drawing/2014/main" id="{7419A767-967A-6D4D-9E53-8F9552A49546}"/>
               </a:ext>
             </a:extLst>
           </p:cNvPr>
@@ -44501,7 +44512,7 @@
           <p:cNvPr id="106" name="Picture 105">
             <a:extLst>
               <a:ext uri="{FF2B5EF4-FFF2-40B4-BE49-F238E27FC236}">
-                <a16:creationId xmlns:a16="http://schemas.microsoft.com/office/drawing/2014/main" xmlns="" id="{8ED2C1EF-570B-9040-8B43-181B549C24A0}"/>
+                <a16:creationId xmlns="" xmlns:a16="http://schemas.microsoft.com/office/drawing/2014/main" id="{8ED2C1EF-570B-9040-8B43-181B549C24A0}"/>
               </a:ext>
             </a:extLst>
           </p:cNvPr>
@@ -44537,7 +44548,7 @@
           <p:cNvPr id="107" name="Rectangle 106">
             <a:extLst>
               <a:ext uri="{FF2B5EF4-FFF2-40B4-BE49-F238E27FC236}">
-                <a16:creationId xmlns:a16="http://schemas.microsoft.com/office/drawing/2014/main" xmlns="" id="{A4D48E59-CA3B-244C-AB66-31C38E83A547}"/>
+                <a16:creationId xmlns="" xmlns:a16="http://schemas.microsoft.com/office/drawing/2014/main" id="{A4D48E59-CA3B-244C-AB66-31C38E83A547}"/>
               </a:ext>
             </a:extLst>
           </p:cNvPr>
@@ -44579,7 +44590,7 @@
           <p:cNvPr id="108" name="ZoneTexte 152">
             <a:extLst>
               <a:ext uri="{FF2B5EF4-FFF2-40B4-BE49-F238E27FC236}">
-                <a16:creationId xmlns:a16="http://schemas.microsoft.com/office/drawing/2014/main" xmlns="" id="{F23BD83C-D9C6-5B4B-A36E-96E75A85CCCC}"/>
+                <a16:creationId xmlns="" xmlns:a16="http://schemas.microsoft.com/office/drawing/2014/main" id="{F23BD83C-D9C6-5B4B-A36E-96E75A85CCCC}"/>
               </a:ext>
             </a:extLst>
           </p:cNvPr>
@@ -44621,7 +44632,7 @@
           <p:cNvPr id="109" name="Rounded Rectangle 108">
             <a:extLst>
               <a:ext uri="{FF2B5EF4-FFF2-40B4-BE49-F238E27FC236}">
-                <a16:creationId xmlns:a16="http://schemas.microsoft.com/office/drawing/2014/main" xmlns="" id="{6C469F44-9A68-8741-A822-8C35CEFF7C08}"/>
+                <a16:creationId xmlns="" xmlns:a16="http://schemas.microsoft.com/office/drawing/2014/main" id="{6C469F44-9A68-8741-A822-8C35CEFF7C08}"/>
               </a:ext>
             </a:extLst>
           </p:cNvPr>
@@ -44742,7 +44753,7 @@
           <p:cNvPr id="110" name="Rounded Rectangle 109">
             <a:extLst>
               <a:ext uri="{FF2B5EF4-FFF2-40B4-BE49-F238E27FC236}">
-                <a16:creationId xmlns:a16="http://schemas.microsoft.com/office/drawing/2014/main" xmlns="" id="{616E709B-8698-0D4B-927C-2A16E8D4CFD1}"/>
+                <a16:creationId xmlns="" xmlns:a16="http://schemas.microsoft.com/office/drawing/2014/main" id="{616E709B-8698-0D4B-927C-2A16E8D4CFD1}"/>
               </a:ext>
             </a:extLst>
           </p:cNvPr>
@@ -44917,7 +44928,7 @@
           <p:cNvPr id="111" name="TextBox 110">
             <a:extLst>
               <a:ext uri="{FF2B5EF4-FFF2-40B4-BE49-F238E27FC236}">
-                <a16:creationId xmlns:a16="http://schemas.microsoft.com/office/drawing/2014/main" xmlns="" id="{908A4FE4-5B0F-2047-ABF4-94BA1A5156A6}"/>
+                <a16:creationId xmlns="" xmlns:a16="http://schemas.microsoft.com/office/drawing/2014/main" id="{908A4FE4-5B0F-2047-ABF4-94BA1A5156A6}"/>
               </a:ext>
             </a:extLst>
           </p:cNvPr>
@@ -44962,7 +44973,7 @@
           <p:cNvPr id="112" name="Elbow Connector 111">
             <a:extLst>
               <a:ext uri="{FF2B5EF4-FFF2-40B4-BE49-F238E27FC236}">
-                <a16:creationId xmlns:a16="http://schemas.microsoft.com/office/drawing/2014/main" xmlns="" id="{6FF86C56-3638-C246-861B-94C043A67990}"/>
+                <a16:creationId xmlns="" xmlns:a16="http://schemas.microsoft.com/office/drawing/2014/main" id="{6FF86C56-3638-C246-861B-94C043A67990}"/>
               </a:ext>
             </a:extLst>
           </p:cNvPr>
@@ -45007,7 +45018,7 @@
           <p:cNvPr id="113" name="Elbow Connector 112">
             <a:extLst>
               <a:ext uri="{FF2B5EF4-FFF2-40B4-BE49-F238E27FC236}">
-                <a16:creationId xmlns:a16="http://schemas.microsoft.com/office/drawing/2014/main" xmlns="" id="{5F19C65F-BAE7-0D47-B260-7D31CAFE8B50}"/>
+                <a16:creationId xmlns="" xmlns:a16="http://schemas.microsoft.com/office/drawing/2014/main" id="{5F19C65F-BAE7-0D47-B260-7D31CAFE8B50}"/>
               </a:ext>
             </a:extLst>
           </p:cNvPr>
@@ -45053,7 +45064,7 @@
           <p:cNvPr id="114" name="Group 113">
             <a:extLst>
               <a:ext uri="{FF2B5EF4-FFF2-40B4-BE49-F238E27FC236}">
-                <a16:creationId xmlns:a16="http://schemas.microsoft.com/office/drawing/2014/main" xmlns="" id="{F07F327D-A1FF-B24F-92F8-53A5ED26856B}"/>
+                <a16:creationId xmlns="" xmlns:a16="http://schemas.microsoft.com/office/drawing/2014/main" id="{F07F327D-A1FF-B24F-92F8-53A5ED26856B}"/>
               </a:ext>
             </a:extLst>
           </p:cNvPr>
@@ -45073,7 +45084,7 @@
             <p:cNvPr id="115" name="Picture 114">
               <a:extLst>
                 <a:ext uri="{FF2B5EF4-FFF2-40B4-BE49-F238E27FC236}">
-                  <a16:creationId xmlns:a16="http://schemas.microsoft.com/office/drawing/2014/main" xmlns="" id="{AFCA2A00-4A89-F748-84A9-0EFA512AB1D7}"/>
+                  <a16:creationId xmlns="" xmlns:a16="http://schemas.microsoft.com/office/drawing/2014/main" id="{AFCA2A00-4A89-F748-84A9-0EFA512AB1D7}"/>
                 </a:ext>
               </a:extLst>
             </p:cNvPr>
@@ -45109,7 +45120,7 @@
             <p:cNvPr id="116" name="TextBox 115">
               <a:extLst>
                 <a:ext uri="{FF2B5EF4-FFF2-40B4-BE49-F238E27FC236}">
-                  <a16:creationId xmlns:a16="http://schemas.microsoft.com/office/drawing/2014/main" xmlns="" id="{CAC831B8-7FFF-7B4A-97C5-5A514FE3DE5B}"/>
+                  <a16:creationId xmlns="" xmlns:a16="http://schemas.microsoft.com/office/drawing/2014/main" id="{CAC831B8-7FFF-7B4A-97C5-5A514FE3DE5B}"/>
                 </a:ext>
               </a:extLst>
             </p:cNvPr>
@@ -45163,7 +45174,7 @@
           <p:cNvPr id="117" name="TextBox 116">
             <a:extLst>
               <a:ext uri="{FF2B5EF4-FFF2-40B4-BE49-F238E27FC236}">
-                <a16:creationId xmlns:a16="http://schemas.microsoft.com/office/drawing/2014/main" xmlns="" id="{405A3C59-EE7C-3945-94FF-F4B8C1857DC2}"/>
+                <a16:creationId xmlns="" xmlns:a16="http://schemas.microsoft.com/office/drawing/2014/main" id="{405A3C59-EE7C-3945-94FF-F4B8C1857DC2}"/>
               </a:ext>
             </a:extLst>
           </p:cNvPr>
@@ -45208,7 +45219,7 @@
           <p:cNvPr id="118" name="Group 117">
             <a:extLst>
               <a:ext uri="{FF2B5EF4-FFF2-40B4-BE49-F238E27FC236}">
-                <a16:creationId xmlns:a16="http://schemas.microsoft.com/office/drawing/2014/main" xmlns="" id="{660712A0-986B-DD45-B4F7-CDC12327A605}"/>
+                <a16:creationId xmlns="" xmlns:a16="http://schemas.microsoft.com/office/drawing/2014/main" id="{660712A0-986B-DD45-B4F7-CDC12327A605}"/>
               </a:ext>
             </a:extLst>
           </p:cNvPr>
@@ -45228,7 +45239,7 @@
             <p:cNvPr id="119" name="Picture 118">
               <a:extLst>
                 <a:ext uri="{FF2B5EF4-FFF2-40B4-BE49-F238E27FC236}">
-                  <a16:creationId xmlns:a16="http://schemas.microsoft.com/office/drawing/2014/main" xmlns="" id="{88B8A7C7-FA04-0545-B0F3-1F16CF07C9A3}"/>
+                  <a16:creationId xmlns="" xmlns:a16="http://schemas.microsoft.com/office/drawing/2014/main" id="{88B8A7C7-FA04-0545-B0F3-1F16CF07C9A3}"/>
                 </a:ext>
               </a:extLst>
             </p:cNvPr>
@@ -45264,7 +45275,7 @@
             <p:cNvPr id="120" name="TextBox 119">
               <a:extLst>
                 <a:ext uri="{FF2B5EF4-FFF2-40B4-BE49-F238E27FC236}">
-                  <a16:creationId xmlns:a16="http://schemas.microsoft.com/office/drawing/2014/main" xmlns="" id="{D2E4BBCA-C4CC-954B-8F64-831D3AE2A995}"/>
+                  <a16:creationId xmlns="" xmlns:a16="http://schemas.microsoft.com/office/drawing/2014/main" id="{D2E4BBCA-C4CC-954B-8F64-831D3AE2A995}"/>
                 </a:ext>
               </a:extLst>
             </p:cNvPr>
@@ -45318,7 +45329,7 @@
           <p:cNvPr id="121" name="TextBox 120">
             <a:extLst>
               <a:ext uri="{FF2B5EF4-FFF2-40B4-BE49-F238E27FC236}">
-                <a16:creationId xmlns:a16="http://schemas.microsoft.com/office/drawing/2014/main" xmlns="" id="{185C4516-D123-AD47-9589-3B95E7BA56F4}"/>
+                <a16:creationId xmlns="" xmlns:a16="http://schemas.microsoft.com/office/drawing/2014/main" id="{185C4516-D123-AD47-9589-3B95E7BA56F4}"/>
               </a:ext>
             </a:extLst>
           </p:cNvPr>
@@ -45363,7 +45374,7 @@
           <p:cNvPr id="122" name="Elbow Connector 121">
             <a:extLst>
               <a:ext uri="{FF2B5EF4-FFF2-40B4-BE49-F238E27FC236}">
-                <a16:creationId xmlns:a16="http://schemas.microsoft.com/office/drawing/2014/main" xmlns="" id="{09EBA0BF-1120-7645-8D8D-E8E658160B73}"/>
+                <a16:creationId xmlns="" xmlns:a16="http://schemas.microsoft.com/office/drawing/2014/main" id="{09EBA0BF-1120-7645-8D8D-E8E658160B73}"/>
               </a:ext>
             </a:extLst>
           </p:cNvPr>
@@ -45409,7 +45420,7 @@
           <p:cNvPr id="123" name="Elbow Connector 122">
             <a:extLst>
               <a:ext uri="{FF2B5EF4-FFF2-40B4-BE49-F238E27FC236}">
-                <a16:creationId xmlns:a16="http://schemas.microsoft.com/office/drawing/2014/main" xmlns="" id="{BA365315-0328-B143-8F8F-41EB352CFC59}"/>
+                <a16:creationId xmlns="" xmlns:a16="http://schemas.microsoft.com/office/drawing/2014/main" id="{BA365315-0328-B143-8F8F-41EB352CFC59}"/>
               </a:ext>
             </a:extLst>
           </p:cNvPr>
@@ -45455,7 +45466,7 @@
           <p:cNvPr id="124" name="Group 123">
             <a:extLst>
               <a:ext uri="{FF2B5EF4-FFF2-40B4-BE49-F238E27FC236}">
-                <a16:creationId xmlns:a16="http://schemas.microsoft.com/office/drawing/2014/main" xmlns="" id="{DEB75B34-3D91-E746-B38E-175B039B02D0}"/>
+                <a16:creationId xmlns="" xmlns:a16="http://schemas.microsoft.com/office/drawing/2014/main" id="{DEB75B34-3D91-E746-B38E-175B039B02D0}"/>
               </a:ext>
             </a:extLst>
           </p:cNvPr>
@@ -45475,7 +45486,7 @@
             <p:cNvPr id="125" name="Picture 124">
               <a:extLst>
                 <a:ext uri="{FF2B5EF4-FFF2-40B4-BE49-F238E27FC236}">
-                  <a16:creationId xmlns:a16="http://schemas.microsoft.com/office/drawing/2014/main" xmlns="" id="{A4DA5A67-0674-5B4F-AC2B-F42213CAC2C5}"/>
+                  <a16:creationId xmlns="" xmlns:a16="http://schemas.microsoft.com/office/drawing/2014/main" id="{A4DA5A67-0674-5B4F-AC2B-F42213CAC2C5}"/>
                 </a:ext>
               </a:extLst>
             </p:cNvPr>
@@ -45511,7 +45522,7 @@
             <p:cNvPr id="126" name="TextBox 125">
               <a:extLst>
                 <a:ext uri="{FF2B5EF4-FFF2-40B4-BE49-F238E27FC236}">
-                  <a16:creationId xmlns:a16="http://schemas.microsoft.com/office/drawing/2014/main" xmlns="" id="{B7F5A429-0AB8-7E4B-B9BC-4F19E81FA1E7}"/>
+                  <a16:creationId xmlns="" xmlns:a16="http://schemas.microsoft.com/office/drawing/2014/main" id="{B7F5A429-0AB8-7E4B-B9BC-4F19E81FA1E7}"/>
                 </a:ext>
               </a:extLst>
             </p:cNvPr>

</xml_diff>